<commit_message>
Documentation update and code naming fix.
</commit_message>
<xml_diff>
--- a/doc/images/architecture_pics.pptx
+++ b/doc/images/architecture_pics.pptx
@@ -6,6 +6,7 @@
   </p:sldMasterIdLst>
   <p:sldIdLst>
     <p:sldId id="256" r:id="rId3"/>
+    <p:sldId id="257" r:id="rId4"/>
   </p:sldIdLst>
   <p:sldSz cx="10080625" cy="5670550"/>
   <p:notesSz cx="7559675" cy="10691812"/>
@@ -53,7 +54,7 @@
       </p:grpSpPr>
       <p:sp>
         <p:nvSpPr>
-          <p:cNvPr id="22" name="PlaceHolder 1"/>
+          <p:cNvPr id="23" name="PlaceHolder 1"/>
           <p:cNvSpPr>
             <a:spLocks noGrp="1"/>
           </p:cNvSpPr>
@@ -64,7 +65,7 @@
         <p:spPr>
           <a:xfrm>
             <a:off x="504000" y="226080"/>
-            <a:ext cx="9071280" cy="946080"/>
+            <a:ext cx="9070920" cy="945720"/>
           </a:xfrm>
           <a:prstGeom prst="rect">
             <a:avLst/>
@@ -84,7 +85,7 @@
       </p:sp>
       <p:sp>
         <p:nvSpPr>
-          <p:cNvPr id="23" name="PlaceHolder 2"/>
+          <p:cNvPr id="24" name="PlaceHolder 2"/>
           <p:cNvSpPr>
             <a:spLocks noGrp="1"/>
           </p:cNvSpPr>
@@ -95,7 +96,7 @@
         <p:spPr>
           <a:xfrm>
             <a:off x="504000" y="1326600"/>
-            <a:ext cx="9072000" cy="1568520"/>
+            <a:ext cx="9071640" cy="1568160"/>
           </a:xfrm>
           <a:prstGeom prst="rect">
             <a:avLst/>
@@ -114,7 +115,7 @@
       </p:sp>
       <p:sp>
         <p:nvSpPr>
-          <p:cNvPr id="24" name="PlaceHolder 3"/>
+          <p:cNvPr id="25" name="PlaceHolder 3"/>
           <p:cNvSpPr>
             <a:spLocks noGrp="1"/>
           </p:cNvSpPr>
@@ -124,8 +125,8 @@
         </p:nvSpPr>
         <p:spPr>
           <a:xfrm>
-            <a:off x="504000" y="3044520"/>
-            <a:ext cx="9072000" cy="1568520"/>
+            <a:off x="504000" y="3044160"/>
+            <a:ext cx="9071640" cy="1568160"/>
           </a:xfrm>
           <a:prstGeom prst="rect">
             <a:avLst/>
@@ -166,7 +167,7 @@
       </p:grpSpPr>
       <p:sp>
         <p:nvSpPr>
-          <p:cNvPr id="25" name="PlaceHolder 1"/>
+          <p:cNvPr id="26" name="PlaceHolder 1"/>
           <p:cNvSpPr>
             <a:spLocks noGrp="1"/>
           </p:cNvSpPr>
@@ -177,7 +178,7 @@
         <p:spPr>
           <a:xfrm>
             <a:off x="504000" y="226080"/>
-            <a:ext cx="9071280" cy="946080"/>
+            <a:ext cx="9070920" cy="945720"/>
           </a:xfrm>
           <a:prstGeom prst="rect">
             <a:avLst/>
@@ -197,7 +198,7 @@
       </p:sp>
       <p:sp>
         <p:nvSpPr>
-          <p:cNvPr id="26" name="PlaceHolder 2"/>
+          <p:cNvPr id="27" name="PlaceHolder 2"/>
           <p:cNvSpPr>
             <a:spLocks noGrp="1"/>
           </p:cNvSpPr>
@@ -208,7 +209,7 @@
         <p:spPr>
           <a:xfrm>
             <a:off x="504000" y="1326600"/>
-            <a:ext cx="4426920" cy="1568520"/>
+            <a:ext cx="4426920" cy="1568160"/>
           </a:xfrm>
           <a:prstGeom prst="rect">
             <a:avLst/>
@@ -227,7 +228,7 @@
       </p:sp>
       <p:sp>
         <p:nvSpPr>
-          <p:cNvPr id="27" name="PlaceHolder 3"/>
+          <p:cNvPr id="28" name="PlaceHolder 3"/>
           <p:cNvSpPr>
             <a:spLocks noGrp="1"/>
           </p:cNvSpPr>
@@ -238,7 +239,7 @@
         <p:spPr>
           <a:xfrm>
             <a:off x="5152680" y="1326600"/>
-            <a:ext cx="4426920" cy="1568520"/>
+            <a:ext cx="4426920" cy="1568160"/>
           </a:xfrm>
           <a:prstGeom prst="rect">
             <a:avLst/>
@@ -257,7 +258,7 @@
       </p:sp>
       <p:sp>
         <p:nvSpPr>
-          <p:cNvPr id="28" name="PlaceHolder 4"/>
+          <p:cNvPr id="29" name="PlaceHolder 4"/>
           <p:cNvSpPr>
             <a:spLocks noGrp="1"/>
           </p:cNvSpPr>
@@ -267,8 +268,8 @@
         </p:nvSpPr>
         <p:spPr>
           <a:xfrm>
-            <a:off x="504000" y="3044520"/>
-            <a:ext cx="4426920" cy="1568520"/>
+            <a:off x="504000" y="3044160"/>
+            <a:ext cx="4426920" cy="1568160"/>
           </a:xfrm>
           <a:prstGeom prst="rect">
             <a:avLst/>
@@ -287,7 +288,7 @@
       </p:sp>
       <p:sp>
         <p:nvSpPr>
-          <p:cNvPr id="29" name="PlaceHolder 5"/>
+          <p:cNvPr id="30" name="PlaceHolder 5"/>
           <p:cNvSpPr>
             <a:spLocks noGrp="1"/>
           </p:cNvSpPr>
@@ -297,8 +298,8 @@
         </p:nvSpPr>
         <p:spPr>
           <a:xfrm>
-            <a:off x="5152680" y="3044520"/>
-            <a:ext cx="4426920" cy="1568520"/>
+            <a:off x="5152680" y="3044160"/>
+            <a:ext cx="4426920" cy="1568160"/>
           </a:xfrm>
           <a:prstGeom prst="rect">
             <a:avLst/>
@@ -339,7 +340,7 @@
       </p:grpSpPr>
       <p:sp>
         <p:nvSpPr>
-          <p:cNvPr id="30" name="PlaceHolder 1"/>
+          <p:cNvPr id="31" name="PlaceHolder 1"/>
           <p:cNvSpPr>
             <a:spLocks noGrp="1"/>
           </p:cNvSpPr>
@@ -350,7 +351,7 @@
         <p:spPr>
           <a:xfrm>
             <a:off x="504000" y="226080"/>
-            <a:ext cx="9071280" cy="946080"/>
+            <a:ext cx="9070920" cy="945720"/>
           </a:xfrm>
           <a:prstGeom prst="rect">
             <a:avLst/>
@@ -370,7 +371,7 @@
       </p:sp>
       <p:sp>
         <p:nvSpPr>
-          <p:cNvPr id="31" name="PlaceHolder 2"/>
+          <p:cNvPr id="32" name="PlaceHolder 2"/>
           <p:cNvSpPr>
             <a:spLocks noGrp="1"/>
           </p:cNvSpPr>
@@ -381,7 +382,7 @@
         <p:spPr>
           <a:xfrm>
             <a:off x="504000" y="1326600"/>
-            <a:ext cx="2921040" cy="1568520"/>
+            <a:ext cx="2920680" cy="1568160"/>
           </a:xfrm>
           <a:prstGeom prst="rect">
             <a:avLst/>
@@ -400,7 +401,7 @@
       </p:sp>
       <p:sp>
         <p:nvSpPr>
-          <p:cNvPr id="32" name="PlaceHolder 3"/>
+          <p:cNvPr id="33" name="PlaceHolder 3"/>
           <p:cNvSpPr>
             <a:spLocks noGrp="1"/>
           </p:cNvSpPr>
@@ -410,8 +411,8 @@
         </p:nvSpPr>
         <p:spPr>
           <a:xfrm>
-            <a:off x="3571560" y="1326600"/>
-            <a:ext cx="2921040" cy="1568520"/>
+            <a:off x="3571200" y="1326600"/>
+            <a:ext cx="2920680" cy="1568160"/>
           </a:xfrm>
           <a:prstGeom prst="rect">
             <a:avLst/>
@@ -430,7 +431,7 @@
       </p:sp>
       <p:sp>
         <p:nvSpPr>
-          <p:cNvPr id="33" name="PlaceHolder 4"/>
+          <p:cNvPr id="34" name="PlaceHolder 4"/>
           <p:cNvSpPr>
             <a:spLocks noGrp="1"/>
           </p:cNvSpPr>
@@ -440,8 +441,8 @@
         </p:nvSpPr>
         <p:spPr>
           <a:xfrm>
-            <a:off x="6639120" y="1326600"/>
-            <a:ext cx="2921040" cy="1568520"/>
+            <a:off x="6638040" y="1326600"/>
+            <a:ext cx="2920680" cy="1568160"/>
           </a:xfrm>
           <a:prstGeom prst="rect">
             <a:avLst/>
@@ -460,7 +461,7 @@
       </p:sp>
       <p:sp>
         <p:nvSpPr>
-          <p:cNvPr id="34" name="PlaceHolder 5"/>
+          <p:cNvPr id="35" name="PlaceHolder 5"/>
           <p:cNvSpPr>
             <a:spLocks noGrp="1"/>
           </p:cNvSpPr>
@@ -470,8 +471,8 @@
         </p:nvSpPr>
         <p:spPr>
           <a:xfrm>
-            <a:off x="504000" y="3044520"/>
-            <a:ext cx="2921040" cy="1568520"/>
+            <a:off x="504000" y="3044160"/>
+            <a:ext cx="2920680" cy="1568160"/>
           </a:xfrm>
           <a:prstGeom prst="rect">
             <a:avLst/>
@@ -490,7 +491,7 @@
       </p:sp>
       <p:sp>
         <p:nvSpPr>
-          <p:cNvPr id="35" name="PlaceHolder 6"/>
+          <p:cNvPr id="36" name="PlaceHolder 6"/>
           <p:cNvSpPr>
             <a:spLocks noGrp="1"/>
           </p:cNvSpPr>
@@ -500,8 +501,8 @@
         </p:nvSpPr>
         <p:spPr>
           <a:xfrm>
-            <a:off x="3571560" y="3044520"/>
-            <a:ext cx="2921040" cy="1568520"/>
+            <a:off x="3571200" y="3044160"/>
+            <a:ext cx="2920680" cy="1568160"/>
           </a:xfrm>
           <a:prstGeom prst="rect">
             <a:avLst/>
@@ -520,7 +521,7 @@
       </p:sp>
       <p:sp>
         <p:nvSpPr>
-          <p:cNvPr id="36" name="PlaceHolder 7"/>
+          <p:cNvPr id="37" name="PlaceHolder 7"/>
           <p:cNvSpPr>
             <a:spLocks noGrp="1"/>
           </p:cNvSpPr>
@@ -530,8 +531,8 @@
         </p:nvSpPr>
         <p:spPr>
           <a:xfrm>
-            <a:off x="6639120" y="3044520"/>
-            <a:ext cx="2921040" cy="1568520"/>
+            <a:off x="6638040" y="3044160"/>
+            <a:ext cx="2920680" cy="1568160"/>
           </a:xfrm>
           <a:prstGeom prst="rect">
             <a:avLst/>
@@ -572,7 +573,7 @@
       </p:grpSpPr>
       <p:sp>
         <p:nvSpPr>
-          <p:cNvPr id="1" name="PlaceHolder 1"/>
+          <p:cNvPr id="2" name="PlaceHolder 1"/>
           <p:cNvSpPr>
             <a:spLocks noGrp="1"/>
           </p:cNvSpPr>
@@ -583,7 +584,7 @@
         <p:spPr>
           <a:xfrm>
             <a:off x="504000" y="226080"/>
-            <a:ext cx="9071280" cy="946080"/>
+            <a:ext cx="9070920" cy="945720"/>
           </a:xfrm>
           <a:prstGeom prst="rect">
             <a:avLst/>
@@ -603,7 +604,7 @@
       </p:sp>
       <p:sp>
         <p:nvSpPr>
-          <p:cNvPr id="2" name="PlaceHolder 2"/>
+          <p:cNvPr id="3" name="PlaceHolder 2"/>
           <p:cNvSpPr>
             <a:spLocks noGrp="1"/>
           </p:cNvSpPr>
@@ -614,7 +615,7 @@
         <p:spPr>
           <a:xfrm>
             <a:off x="504000" y="1326600"/>
-            <a:ext cx="9072000" cy="3288600"/>
+            <a:ext cx="9071640" cy="3288240"/>
           </a:xfrm>
           <a:prstGeom prst="rect">
             <a:avLst/>
@@ -656,7 +657,7 @@
       </p:grpSpPr>
       <p:sp>
         <p:nvSpPr>
-          <p:cNvPr id="3" name="PlaceHolder 1"/>
+          <p:cNvPr id="4" name="PlaceHolder 1"/>
           <p:cNvSpPr>
             <a:spLocks noGrp="1"/>
           </p:cNvSpPr>
@@ -667,7 +668,7 @@
         <p:spPr>
           <a:xfrm>
             <a:off x="504000" y="226080"/>
-            <a:ext cx="9071280" cy="946080"/>
+            <a:ext cx="9070920" cy="945720"/>
           </a:xfrm>
           <a:prstGeom prst="rect">
             <a:avLst/>
@@ -687,7 +688,7 @@
       </p:sp>
       <p:sp>
         <p:nvSpPr>
-          <p:cNvPr id="4" name="PlaceHolder 2"/>
+          <p:cNvPr id="5" name="PlaceHolder 2"/>
           <p:cNvSpPr>
             <a:spLocks noGrp="1"/>
           </p:cNvSpPr>
@@ -698,7 +699,7 @@
         <p:spPr>
           <a:xfrm>
             <a:off x="504000" y="1326600"/>
-            <a:ext cx="9072000" cy="3288600"/>
+            <a:ext cx="9071640" cy="3288240"/>
           </a:xfrm>
           <a:prstGeom prst="rect">
             <a:avLst/>
@@ -739,7 +740,7 @@
       </p:grpSpPr>
       <p:sp>
         <p:nvSpPr>
-          <p:cNvPr id="5" name="PlaceHolder 1"/>
+          <p:cNvPr id="6" name="PlaceHolder 1"/>
           <p:cNvSpPr>
             <a:spLocks noGrp="1"/>
           </p:cNvSpPr>
@@ -750,7 +751,7 @@
         <p:spPr>
           <a:xfrm>
             <a:off x="504000" y="226080"/>
-            <a:ext cx="9071280" cy="946080"/>
+            <a:ext cx="9070920" cy="945720"/>
           </a:xfrm>
           <a:prstGeom prst="rect">
             <a:avLst/>
@@ -770,7 +771,7 @@
       </p:sp>
       <p:sp>
         <p:nvSpPr>
-          <p:cNvPr id="6" name="PlaceHolder 2"/>
+          <p:cNvPr id="7" name="PlaceHolder 2"/>
           <p:cNvSpPr>
             <a:spLocks noGrp="1"/>
           </p:cNvSpPr>
@@ -781,7 +782,7 @@
         <p:spPr>
           <a:xfrm>
             <a:off x="504000" y="1326600"/>
-            <a:ext cx="4426920" cy="3288600"/>
+            <a:ext cx="4426920" cy="3288240"/>
           </a:xfrm>
           <a:prstGeom prst="rect">
             <a:avLst/>
@@ -800,7 +801,7 @@
       </p:sp>
       <p:sp>
         <p:nvSpPr>
-          <p:cNvPr id="7" name="PlaceHolder 3"/>
+          <p:cNvPr id="8" name="PlaceHolder 3"/>
           <p:cNvSpPr>
             <a:spLocks noGrp="1"/>
           </p:cNvSpPr>
@@ -811,7 +812,7 @@
         <p:spPr>
           <a:xfrm>
             <a:off x="5152680" y="1326600"/>
-            <a:ext cx="4426920" cy="3288600"/>
+            <a:ext cx="4426920" cy="3288240"/>
           </a:xfrm>
           <a:prstGeom prst="rect">
             <a:avLst/>
@@ -852,7 +853,7 @@
       </p:grpSpPr>
       <p:sp>
         <p:nvSpPr>
-          <p:cNvPr id="8" name="PlaceHolder 1"/>
+          <p:cNvPr id="9" name="PlaceHolder 1"/>
           <p:cNvSpPr>
             <a:spLocks noGrp="1"/>
           </p:cNvSpPr>
@@ -863,7 +864,7 @@
         <p:spPr>
           <a:xfrm>
             <a:off x="504000" y="226080"/>
-            <a:ext cx="9071280" cy="946080"/>
+            <a:ext cx="9070920" cy="945720"/>
           </a:xfrm>
           <a:prstGeom prst="rect">
             <a:avLst/>
@@ -905,7 +906,7 @@
       </p:grpSpPr>
       <p:sp>
         <p:nvSpPr>
-          <p:cNvPr id="9" name="PlaceHolder 1"/>
+          <p:cNvPr id="10" name="PlaceHolder 1"/>
           <p:cNvSpPr>
             <a:spLocks noGrp="1"/>
           </p:cNvSpPr>
@@ -916,7 +917,7 @@
         <p:spPr>
           <a:xfrm>
             <a:off x="504000" y="226080"/>
-            <a:ext cx="9071280" cy="4386600"/>
+            <a:ext cx="9070920" cy="4385160"/>
           </a:xfrm>
           <a:prstGeom prst="rect">
             <a:avLst/>
@@ -958,7 +959,7 @@
       </p:grpSpPr>
       <p:sp>
         <p:nvSpPr>
-          <p:cNvPr id="10" name="PlaceHolder 1"/>
+          <p:cNvPr id="11" name="PlaceHolder 1"/>
           <p:cNvSpPr>
             <a:spLocks noGrp="1"/>
           </p:cNvSpPr>
@@ -969,7 +970,7 @@
         <p:spPr>
           <a:xfrm>
             <a:off x="504000" y="226080"/>
-            <a:ext cx="9071280" cy="946080"/>
+            <a:ext cx="9070920" cy="945720"/>
           </a:xfrm>
           <a:prstGeom prst="rect">
             <a:avLst/>
@@ -989,7 +990,7 @@
       </p:sp>
       <p:sp>
         <p:nvSpPr>
-          <p:cNvPr id="11" name="PlaceHolder 2"/>
+          <p:cNvPr id="12" name="PlaceHolder 2"/>
           <p:cNvSpPr>
             <a:spLocks noGrp="1"/>
           </p:cNvSpPr>
@@ -1000,7 +1001,7 @@
         <p:spPr>
           <a:xfrm>
             <a:off x="504000" y="1326600"/>
-            <a:ext cx="4426920" cy="1568520"/>
+            <a:ext cx="4426920" cy="1568160"/>
           </a:xfrm>
           <a:prstGeom prst="rect">
             <a:avLst/>
@@ -1019,7 +1020,7 @@
       </p:sp>
       <p:sp>
         <p:nvSpPr>
-          <p:cNvPr id="12" name="PlaceHolder 3"/>
+          <p:cNvPr id="13" name="PlaceHolder 3"/>
           <p:cNvSpPr>
             <a:spLocks noGrp="1"/>
           </p:cNvSpPr>
@@ -1030,7 +1031,7 @@
         <p:spPr>
           <a:xfrm>
             <a:off x="5152680" y="1326600"/>
-            <a:ext cx="4426920" cy="3288600"/>
+            <a:ext cx="4426920" cy="3288240"/>
           </a:xfrm>
           <a:prstGeom prst="rect">
             <a:avLst/>
@@ -1049,7 +1050,7 @@
       </p:sp>
       <p:sp>
         <p:nvSpPr>
-          <p:cNvPr id="13" name="PlaceHolder 4"/>
+          <p:cNvPr id="14" name="PlaceHolder 4"/>
           <p:cNvSpPr>
             <a:spLocks noGrp="1"/>
           </p:cNvSpPr>
@@ -1059,8 +1060,8 @@
         </p:nvSpPr>
         <p:spPr>
           <a:xfrm>
-            <a:off x="504000" y="3044520"/>
-            <a:ext cx="4426920" cy="1568520"/>
+            <a:off x="504000" y="3044160"/>
+            <a:ext cx="4426920" cy="1568160"/>
           </a:xfrm>
           <a:prstGeom prst="rect">
             <a:avLst/>
@@ -1101,7 +1102,7 @@
       </p:grpSpPr>
       <p:sp>
         <p:nvSpPr>
-          <p:cNvPr id="14" name="PlaceHolder 1"/>
+          <p:cNvPr id="15" name="PlaceHolder 1"/>
           <p:cNvSpPr>
             <a:spLocks noGrp="1"/>
           </p:cNvSpPr>
@@ -1112,7 +1113,7 @@
         <p:spPr>
           <a:xfrm>
             <a:off x="504000" y="226080"/>
-            <a:ext cx="9071280" cy="946080"/>
+            <a:ext cx="9070920" cy="945720"/>
           </a:xfrm>
           <a:prstGeom prst="rect">
             <a:avLst/>
@@ -1132,7 +1133,7 @@
       </p:sp>
       <p:sp>
         <p:nvSpPr>
-          <p:cNvPr id="15" name="PlaceHolder 2"/>
+          <p:cNvPr id="16" name="PlaceHolder 2"/>
           <p:cNvSpPr>
             <a:spLocks noGrp="1"/>
           </p:cNvSpPr>
@@ -1143,7 +1144,7 @@
         <p:spPr>
           <a:xfrm>
             <a:off x="504000" y="1326600"/>
-            <a:ext cx="4426920" cy="3288600"/>
+            <a:ext cx="4426920" cy="3288240"/>
           </a:xfrm>
           <a:prstGeom prst="rect">
             <a:avLst/>
@@ -1162,7 +1163,7 @@
       </p:sp>
       <p:sp>
         <p:nvSpPr>
-          <p:cNvPr id="16" name="PlaceHolder 3"/>
+          <p:cNvPr id="17" name="PlaceHolder 3"/>
           <p:cNvSpPr>
             <a:spLocks noGrp="1"/>
           </p:cNvSpPr>
@@ -1173,7 +1174,7 @@
         <p:spPr>
           <a:xfrm>
             <a:off x="5152680" y="1326600"/>
-            <a:ext cx="4426920" cy="1568520"/>
+            <a:ext cx="4426920" cy="1568160"/>
           </a:xfrm>
           <a:prstGeom prst="rect">
             <a:avLst/>
@@ -1192,7 +1193,7 @@
       </p:sp>
       <p:sp>
         <p:nvSpPr>
-          <p:cNvPr id="17" name="PlaceHolder 4"/>
+          <p:cNvPr id="18" name="PlaceHolder 4"/>
           <p:cNvSpPr>
             <a:spLocks noGrp="1"/>
           </p:cNvSpPr>
@@ -1202,8 +1203,8 @@
         </p:nvSpPr>
         <p:spPr>
           <a:xfrm>
-            <a:off x="5152680" y="3044520"/>
-            <a:ext cx="4426920" cy="1568520"/>
+            <a:off x="5152680" y="3044160"/>
+            <a:ext cx="4426920" cy="1568160"/>
           </a:xfrm>
           <a:prstGeom prst="rect">
             <a:avLst/>
@@ -1244,7 +1245,7 @@
       </p:grpSpPr>
       <p:sp>
         <p:nvSpPr>
-          <p:cNvPr id="18" name="PlaceHolder 1"/>
+          <p:cNvPr id="19" name="PlaceHolder 1"/>
           <p:cNvSpPr>
             <a:spLocks noGrp="1"/>
           </p:cNvSpPr>
@@ -1255,7 +1256,7 @@
         <p:spPr>
           <a:xfrm>
             <a:off x="504000" y="226080"/>
-            <a:ext cx="9071280" cy="946080"/>
+            <a:ext cx="9070920" cy="945720"/>
           </a:xfrm>
           <a:prstGeom prst="rect">
             <a:avLst/>
@@ -1275,7 +1276,7 @@
       </p:sp>
       <p:sp>
         <p:nvSpPr>
-          <p:cNvPr id="19" name="PlaceHolder 2"/>
+          <p:cNvPr id="20" name="PlaceHolder 2"/>
           <p:cNvSpPr>
             <a:spLocks noGrp="1"/>
           </p:cNvSpPr>
@@ -1286,7 +1287,7 @@
         <p:spPr>
           <a:xfrm>
             <a:off x="504000" y="1326600"/>
-            <a:ext cx="4426920" cy="1568520"/>
+            <a:ext cx="4426920" cy="1568160"/>
           </a:xfrm>
           <a:prstGeom prst="rect">
             <a:avLst/>
@@ -1305,7 +1306,7 @@
       </p:sp>
       <p:sp>
         <p:nvSpPr>
-          <p:cNvPr id="20" name="PlaceHolder 3"/>
+          <p:cNvPr id="21" name="PlaceHolder 3"/>
           <p:cNvSpPr>
             <a:spLocks noGrp="1"/>
           </p:cNvSpPr>
@@ -1316,7 +1317,7 @@
         <p:spPr>
           <a:xfrm>
             <a:off x="5152680" y="1326600"/>
-            <a:ext cx="4426920" cy="1568520"/>
+            <a:ext cx="4426920" cy="1568160"/>
           </a:xfrm>
           <a:prstGeom prst="rect">
             <a:avLst/>
@@ -1335,7 +1336,7 @@
       </p:sp>
       <p:sp>
         <p:nvSpPr>
-          <p:cNvPr id="21" name="PlaceHolder 4"/>
+          <p:cNvPr id="22" name="PlaceHolder 4"/>
           <p:cNvSpPr>
             <a:spLocks noGrp="1"/>
           </p:cNvSpPr>
@@ -1345,8 +1346,8 @@
         </p:nvSpPr>
         <p:spPr>
           <a:xfrm>
-            <a:off x="504000" y="3044520"/>
-            <a:ext cx="9072000" cy="1568520"/>
+            <a:off x="504000" y="3044160"/>
+            <a:ext cx="9071640" cy="1568160"/>
           </a:xfrm>
           <a:prstGeom prst="rect">
             <a:avLst/>
@@ -1398,7 +1399,7 @@
         <p:spPr>
           <a:xfrm>
             <a:off x="504000" y="226080"/>
-            <a:ext cx="9071280" cy="946080"/>
+            <a:ext cx="9070920" cy="945720"/>
           </a:xfrm>
           <a:prstGeom prst="rect">
             <a:avLst/>
@@ -1415,6 +1416,185 @@
                 <a:latin typeface="Arial"/>
               </a:rPr>
               <a:t>Click to edit the title text format</a:t>
+            </a:r>
+            <a:endParaRPr b="0" lang="en-US" sz="1800" spc="-1" strike="noStrike">
+              <a:latin typeface="Arial"/>
+            </a:endParaRPr>
+          </a:p>
+        </p:txBody>
+      </p:sp>
+      <p:sp>
+        <p:nvSpPr>
+          <p:cNvPr id="1" name="PlaceHolder 2"/>
+          <p:cNvSpPr>
+            <a:spLocks noGrp="1"/>
+          </p:cNvSpPr>
+          <p:nvPr>
+            <p:ph type="body"/>
+          </p:nvPr>
+        </p:nvSpPr>
+        <p:spPr>
+          <a:xfrm>
+            <a:off x="504000" y="1326600"/>
+            <a:ext cx="9071640" cy="3288240"/>
+          </a:xfrm>
+          <a:prstGeom prst="rect">
+            <a:avLst/>
+          </a:prstGeom>
+        </p:spPr>
+        <p:txBody>
+          <a:bodyPr lIns="0" rIns="0" tIns="0" bIns="0">
+            <a:normAutofit/>
+          </a:bodyPr>
+          <a:p>
+            <a:pPr marL="432000" indent="-324000" algn="ctr">
+              <a:spcBef>
+                <a:spcPts val="1417"/>
+              </a:spcBef>
+              <a:buClr>
+                <a:srgbClr val="000000"/>
+              </a:buClr>
+              <a:buSzPct val="45000"/>
+              <a:buFont typeface="Wingdings" charset="2"/>
+              <a:buChar char=""/>
+            </a:pPr>
+            <a:r>
+              <a:rPr b="0" lang="en-US" sz="1800" spc="-1" strike="noStrike">
+                <a:latin typeface="Arial"/>
+              </a:rPr>
+              <a:t>Click to edit the outline text format</a:t>
+            </a:r>
+            <a:endParaRPr b="0" lang="en-US" sz="1800" spc="-1" strike="noStrike">
+              <a:latin typeface="Arial"/>
+            </a:endParaRPr>
+          </a:p>
+          <a:p>
+            <a:pPr lvl="1" marL="864000" indent="-324000" algn="ctr">
+              <a:spcBef>
+                <a:spcPts val="1134"/>
+              </a:spcBef>
+              <a:buClr>
+                <a:srgbClr val="000000"/>
+              </a:buClr>
+              <a:buSzPct val="75000"/>
+              <a:buFont typeface="Symbol" charset="2"/>
+              <a:buChar char=""/>
+            </a:pPr>
+            <a:r>
+              <a:rPr b="0" lang="en-US" sz="1800" spc="-1" strike="noStrike">
+                <a:latin typeface="Arial"/>
+              </a:rPr>
+              <a:t>Second Outline Level</a:t>
+            </a:r>
+            <a:endParaRPr b="0" lang="en-US" sz="1800" spc="-1" strike="noStrike">
+              <a:latin typeface="Arial"/>
+            </a:endParaRPr>
+          </a:p>
+          <a:p>
+            <a:pPr lvl="2" marL="1296000" indent="-288000" algn="ctr">
+              <a:spcBef>
+                <a:spcPts val="850"/>
+              </a:spcBef>
+              <a:buClr>
+                <a:srgbClr val="000000"/>
+              </a:buClr>
+              <a:buSzPct val="45000"/>
+              <a:buFont typeface="Wingdings" charset="2"/>
+              <a:buChar char=""/>
+            </a:pPr>
+            <a:r>
+              <a:rPr b="0" lang="en-US" sz="1800" spc="-1" strike="noStrike">
+                <a:latin typeface="Arial"/>
+              </a:rPr>
+              <a:t>Third Outline Level</a:t>
+            </a:r>
+            <a:endParaRPr b="0" lang="en-US" sz="1800" spc="-1" strike="noStrike">
+              <a:latin typeface="Arial"/>
+            </a:endParaRPr>
+          </a:p>
+          <a:p>
+            <a:pPr lvl="3" marL="1728000" indent="-216000" algn="ctr">
+              <a:spcBef>
+                <a:spcPts val="567"/>
+              </a:spcBef>
+              <a:buClr>
+                <a:srgbClr val="000000"/>
+              </a:buClr>
+              <a:buSzPct val="75000"/>
+              <a:buFont typeface="Symbol" charset="2"/>
+              <a:buChar char=""/>
+            </a:pPr>
+            <a:r>
+              <a:rPr b="0" lang="en-US" sz="1800" spc="-1" strike="noStrike">
+                <a:latin typeface="Arial"/>
+              </a:rPr>
+              <a:t>Fourth Outline Level</a:t>
+            </a:r>
+            <a:endParaRPr b="0" lang="en-US" sz="1800" spc="-1" strike="noStrike">
+              <a:latin typeface="Arial"/>
+            </a:endParaRPr>
+          </a:p>
+          <a:p>
+            <a:pPr lvl="4" marL="2160000" indent="-216000" algn="ctr">
+              <a:spcBef>
+                <a:spcPts val="283"/>
+              </a:spcBef>
+              <a:buClr>
+                <a:srgbClr val="000000"/>
+              </a:buClr>
+              <a:buSzPct val="45000"/>
+              <a:buFont typeface="Wingdings" charset="2"/>
+              <a:buChar char=""/>
+            </a:pPr>
+            <a:r>
+              <a:rPr b="0" lang="en-US" sz="1800" spc="-1" strike="noStrike">
+                <a:latin typeface="Arial"/>
+              </a:rPr>
+              <a:t>Fifth Outline Level</a:t>
+            </a:r>
+            <a:endParaRPr b="0" lang="en-US" sz="1800" spc="-1" strike="noStrike">
+              <a:latin typeface="Arial"/>
+            </a:endParaRPr>
+          </a:p>
+          <a:p>
+            <a:pPr lvl="5" marL="2592000" indent="-216000" algn="ctr">
+              <a:spcBef>
+                <a:spcPts val="283"/>
+              </a:spcBef>
+              <a:buClr>
+                <a:srgbClr val="000000"/>
+              </a:buClr>
+              <a:buSzPct val="45000"/>
+              <a:buFont typeface="Wingdings" charset="2"/>
+              <a:buChar char=""/>
+            </a:pPr>
+            <a:r>
+              <a:rPr b="0" lang="en-US" sz="1800" spc="-1" strike="noStrike">
+                <a:latin typeface="Arial"/>
+              </a:rPr>
+              <a:t>Sixth Outline Level</a:t>
+            </a:r>
+            <a:endParaRPr b="0" lang="en-US" sz="1800" spc="-1" strike="noStrike">
+              <a:latin typeface="Arial"/>
+            </a:endParaRPr>
+          </a:p>
+          <a:p>
+            <a:pPr lvl="6" marL="3024000" indent="-216000" algn="ctr">
+              <a:spcBef>
+                <a:spcPts val="283"/>
+              </a:spcBef>
+              <a:buClr>
+                <a:srgbClr val="000000"/>
+              </a:buClr>
+              <a:buSzPct val="45000"/>
+              <a:buFont typeface="Wingdings" charset="2"/>
+              <a:buChar char=""/>
+            </a:pPr>
+            <a:r>
+              <a:rPr b="0" lang="en-US" sz="1800" spc="-1" strike="noStrike">
+                <a:latin typeface="Arial"/>
+              </a:rPr>
+              <a:t>Seventh Outline Level</a:t>
             </a:r>
             <a:endParaRPr b="0" lang="en-US" sz="1800" spc="-1" strike="noStrike">
               <a:latin typeface="Arial"/>
@@ -1461,20 +1641,20 @@
       </p:grpSpPr>
       <p:sp>
         <p:nvSpPr>
-          <p:cNvPr id="37" name="CustomShape 1"/>
+          <p:cNvPr id="38" name="CustomShape 1"/>
           <p:cNvSpPr/>
           <p:nvPr/>
         </p:nvSpPr>
         <p:spPr>
           <a:xfrm>
             <a:off x="640080" y="822960"/>
-            <a:ext cx="1645920" cy="1097280"/>
+            <a:ext cx="1645560" cy="1096920"/>
           </a:xfrm>
           <a:custGeom>
             <a:avLst/>
             <a:gdLst/>
             <a:ahLst/>
-            <a:rect l="0" t="0" r="r" b="b"/>
+            <a:rect l="l" t="t" r="r" b="b"/>
             <a:pathLst>
               <a:path w="4574" h="3050">
                 <a:moveTo>
@@ -1590,10 +1770,18 @@
             <a:noAutofit/>
           </a:bodyPr>
           <a:p>
-            <a:pPr algn="ctr"/>
+            <a:pPr algn="ctr">
+              <a:lnSpc>
+                <a:spcPct val="100000"/>
+              </a:lnSpc>
+            </a:pPr>
             <a:r>
               <a:rPr b="0" lang="en-US" sz="1800" spc="-1" strike="noStrike">
+                <a:solidFill>
+                  <a:srgbClr val="000000"/>
+                </a:solidFill>
                 <a:latin typeface="Arial"/>
+                <a:ea typeface="DejaVu Sans"/>
               </a:rPr>
               <a:t>AADL</a:t>
             </a:r>
@@ -1602,10 +1790,18 @@
             </a:endParaRPr>
           </a:p>
           <a:p>
-            <a:pPr algn="ctr"/>
+            <a:pPr algn="ctr">
+              <a:lnSpc>
+                <a:spcPct val="100000"/>
+              </a:lnSpc>
+            </a:pPr>
             <a:r>
               <a:rPr b="0" lang="en-US" sz="1800" spc="-1" strike="noStrike">
+                <a:solidFill>
+                  <a:srgbClr val="000000"/>
+                </a:solidFill>
                 <a:latin typeface="Arial"/>
+                <a:ea typeface="DejaVu Sans"/>
               </a:rPr>
               <a:t>Editor</a:t>
             </a:r>
@@ -1617,20 +1813,20 @@
       </p:sp>
       <p:sp>
         <p:nvSpPr>
-          <p:cNvPr id="38" name="CustomShape 2"/>
+          <p:cNvPr id="39" name="CustomShape 2"/>
           <p:cNvSpPr/>
           <p:nvPr/>
         </p:nvSpPr>
         <p:spPr>
           <a:xfrm>
             <a:off x="2468880" y="822960"/>
-            <a:ext cx="1645920" cy="1097280"/>
+            <a:ext cx="1645560" cy="1096920"/>
           </a:xfrm>
           <a:custGeom>
             <a:avLst/>
             <a:gdLst/>
             <a:ahLst/>
-            <a:rect l="0" t="0" r="r" b="b"/>
+            <a:rect l="l" t="t" r="r" b="b"/>
             <a:pathLst>
               <a:path w="4574" h="3050">
                 <a:moveTo>
@@ -1746,10 +1942,18 @@
             <a:noAutofit/>
           </a:bodyPr>
           <a:p>
-            <a:pPr algn="ctr"/>
+            <a:pPr algn="ctr">
+              <a:lnSpc>
+                <a:spcPct val="100000"/>
+              </a:lnSpc>
+            </a:pPr>
             <a:r>
               <a:rPr b="0" lang="en-US" sz="1800" spc="-1" strike="noStrike">
+                <a:solidFill>
+                  <a:srgbClr val="000000"/>
+                </a:solidFill>
                 <a:latin typeface="Arial"/>
+                <a:ea typeface="DejaVu Sans"/>
               </a:rPr>
               <a:t>ASN.1</a:t>
             </a:r>
@@ -1758,10 +1962,18 @@
             </a:endParaRPr>
           </a:p>
           <a:p>
-            <a:pPr algn="ctr"/>
+            <a:pPr algn="ctr">
+              <a:lnSpc>
+                <a:spcPct val="100000"/>
+              </a:lnSpc>
+            </a:pPr>
             <a:r>
               <a:rPr b="0" lang="en-US" sz="1800" spc="-1" strike="noStrike">
+                <a:solidFill>
+                  <a:srgbClr val="000000"/>
+                </a:solidFill>
                 <a:latin typeface="Arial"/>
+                <a:ea typeface="DejaVu Sans"/>
               </a:rPr>
               <a:t>Editor</a:t>
             </a:r>
@@ -1773,20 +1985,20 @@
       </p:sp>
       <p:sp>
         <p:nvSpPr>
-          <p:cNvPr id="39" name="CustomShape 3"/>
+          <p:cNvPr id="40" name="CustomShape 3"/>
           <p:cNvSpPr/>
           <p:nvPr/>
         </p:nvSpPr>
         <p:spPr>
           <a:xfrm>
             <a:off x="4297680" y="822960"/>
-            <a:ext cx="1645920" cy="1097280"/>
+            <a:ext cx="1645560" cy="1096920"/>
           </a:xfrm>
           <a:custGeom>
             <a:avLst/>
             <a:gdLst/>
             <a:ahLst/>
-            <a:rect l="0" t="0" r="r" b="b"/>
+            <a:rect l="l" t="t" r="r" b="b"/>
             <a:pathLst>
               <a:path w="4574" h="3050">
                 <a:moveTo>
@@ -1902,10 +2114,18 @@
             <a:noAutofit/>
           </a:bodyPr>
           <a:p>
-            <a:pPr algn="ctr"/>
+            <a:pPr algn="ctr">
+              <a:lnSpc>
+                <a:spcPct val="100000"/>
+              </a:lnSpc>
+            </a:pPr>
             <a:r>
               <a:rPr b="0" lang="en-US" sz="1800" spc="-1" strike="noStrike">
+                <a:solidFill>
+                  <a:srgbClr val="000000"/>
+                </a:solidFill>
                 <a:latin typeface="Arial"/>
+                <a:ea typeface="DejaVu Sans"/>
               </a:rPr>
               <a:t>MSC</a:t>
             </a:r>
@@ -1914,10 +2134,18 @@
             </a:endParaRPr>
           </a:p>
           <a:p>
-            <a:pPr algn="ctr"/>
+            <a:pPr algn="ctr">
+              <a:lnSpc>
+                <a:spcPct val="100000"/>
+              </a:lnSpc>
+            </a:pPr>
             <a:r>
               <a:rPr b="0" lang="en-US" sz="1800" spc="-1" strike="noStrike">
+                <a:solidFill>
+                  <a:srgbClr val="000000"/>
+                </a:solidFill>
                 <a:latin typeface="Arial"/>
+                <a:ea typeface="DejaVu Sans"/>
               </a:rPr>
               <a:t>Editor</a:t>
             </a:r>
@@ -1929,20 +2157,20 @@
       </p:sp>
       <p:sp>
         <p:nvSpPr>
-          <p:cNvPr id="40" name="CustomShape 4"/>
+          <p:cNvPr id="41" name="CustomShape 4"/>
           <p:cNvSpPr/>
           <p:nvPr/>
         </p:nvSpPr>
         <p:spPr>
           <a:xfrm>
             <a:off x="640440" y="182880"/>
-            <a:ext cx="5303160" cy="548640"/>
+            <a:ext cx="5302800" cy="548280"/>
           </a:xfrm>
           <a:custGeom>
             <a:avLst/>
             <a:gdLst/>
             <a:ahLst/>
-            <a:rect l="0" t="0" r="r" b="b"/>
+            <a:rect l="l" t="t" r="r" b="b"/>
             <a:pathLst>
               <a:path w="14733" h="1526">
                 <a:moveTo>
@@ -2058,10 +2286,18 @@
             <a:noAutofit/>
           </a:bodyPr>
           <a:p>
-            <a:pPr algn="ctr"/>
+            <a:pPr algn="ctr">
+              <a:lnSpc>
+                <a:spcPct val="100000"/>
+              </a:lnSpc>
+            </a:pPr>
             <a:r>
               <a:rPr b="0" lang="en-US" sz="1800" spc="-1" strike="noStrike">
+                <a:solidFill>
+                  <a:srgbClr val="000000"/>
+                </a:solidFill>
                 <a:latin typeface="Arial"/>
+                <a:ea typeface="DejaVu Sans"/>
               </a:rPr>
               <a:t>Space Creator</a:t>
             </a:r>
@@ -2070,6 +2306,1240 @@
             </a:endParaRPr>
           </a:p>
         </p:txBody>
+      </p:sp>
+    </p:spTree>
+  </p:cSld>
+  <mc:AlternateContent>
+    <mc:Choice Requires="p14">
+      <p:transition spd="slow" p14:dur="2000"/>
+    </mc:Choice>
+    <mc:Fallback>
+      <p:transition spd="slow"/>
+    </mc:Fallback>
+  </mc:AlternateContent>
+</p:sld>
+</file>
+
+<file path=ppt/slides/slide2.xml><?xml version="1.0" encoding="utf-8"?>
+<p:sld xmlns:a="http://schemas.openxmlformats.org/drawingml/2006/main" xmlns:p="http://schemas.openxmlformats.org/presentationml/2006/main" xmlns:r="http://schemas.openxmlformats.org/officeDocument/2006/relationships" xmlns:p14="http://schemas.microsoft.com/office/powerpoint/2010/main" xmlns:p15="http://schemas.microsoft.com/office/powerpoint/2012/main" xmlns:mc="http://schemas.openxmlformats.org/markup-compatibility/2006">
+  <p:cSld>
+    <p:spTree>
+      <p:nvGrpSpPr>
+        <p:cNvPr id="1" name=""/>
+        <p:cNvGrpSpPr/>
+        <p:nvPr/>
+      </p:nvGrpSpPr>
+      <p:grpSpPr>
+        <a:xfrm>
+          <a:off x="0" y="0"/>
+          <a:ext cx="0" cy="0"/>
+          <a:chOff x="0" y="0"/>
+          <a:chExt cx="0" cy="0"/>
+        </a:xfrm>
+      </p:grpSpPr>
+      <p:sp>
+        <p:nvSpPr>
+          <p:cNvPr id="42" name="CustomShape 1"/>
+          <p:cNvSpPr/>
+          <p:nvPr/>
+        </p:nvSpPr>
+        <p:spPr>
+          <a:xfrm>
+            <a:off x="1828800" y="182880"/>
+            <a:ext cx="1828800" cy="1737360"/>
+          </a:xfrm>
+          <a:custGeom>
+            <a:avLst/>
+            <a:gdLst/>
+            <a:ahLst/>
+            <a:rect l="l" t="t" r="r" b="b"/>
+            <a:pathLst>
+              <a:path w="14733" h="1526">
+                <a:moveTo>
+                  <a:pt x="254" y="0"/>
+                </a:moveTo>
+                <a:lnTo>
+                  <a:pt x="254" y="0"/>
+                </a:lnTo>
+                <a:cubicBezTo>
+                  <a:pt x="210" y="0"/>
+                  <a:pt x="166" y="12"/>
+                  <a:pt x="127" y="34"/>
+                </a:cubicBezTo>
+                <a:cubicBezTo>
+                  <a:pt x="88" y="56"/>
+                  <a:pt x="56" y="88"/>
+                  <a:pt x="34" y="127"/>
+                </a:cubicBezTo>
+                <a:cubicBezTo>
+                  <a:pt x="12" y="166"/>
+                  <a:pt x="0" y="210"/>
+                  <a:pt x="0" y="254"/>
+                </a:cubicBezTo>
+                <a:lnTo>
+                  <a:pt x="0" y="1270"/>
+                </a:lnTo>
+                <a:lnTo>
+                  <a:pt x="0" y="1271"/>
+                </a:lnTo>
+                <a:cubicBezTo>
+                  <a:pt x="0" y="1315"/>
+                  <a:pt x="12" y="1359"/>
+                  <a:pt x="34" y="1398"/>
+                </a:cubicBezTo>
+                <a:cubicBezTo>
+                  <a:pt x="56" y="1437"/>
+                  <a:pt x="88" y="1469"/>
+                  <a:pt x="127" y="1491"/>
+                </a:cubicBezTo>
+                <a:cubicBezTo>
+                  <a:pt x="166" y="1513"/>
+                  <a:pt x="210" y="1525"/>
+                  <a:pt x="254" y="1525"/>
+                </a:cubicBezTo>
+                <a:lnTo>
+                  <a:pt x="14477" y="1524"/>
+                </a:lnTo>
+                <a:lnTo>
+                  <a:pt x="14478" y="1525"/>
+                </a:lnTo>
+                <a:cubicBezTo>
+                  <a:pt x="14522" y="1525"/>
+                  <a:pt x="14566" y="1513"/>
+                  <a:pt x="14605" y="1491"/>
+                </a:cubicBezTo>
+                <a:cubicBezTo>
+                  <a:pt x="14644" y="1469"/>
+                  <a:pt x="14676" y="1437"/>
+                  <a:pt x="14698" y="1398"/>
+                </a:cubicBezTo>
+                <a:cubicBezTo>
+                  <a:pt x="14720" y="1359"/>
+                  <a:pt x="14732" y="1315"/>
+                  <a:pt x="14732" y="1271"/>
+                </a:cubicBezTo>
+                <a:lnTo>
+                  <a:pt x="14731" y="254"/>
+                </a:lnTo>
+                <a:lnTo>
+                  <a:pt x="14732" y="254"/>
+                </a:lnTo>
+                <a:lnTo>
+                  <a:pt x="14732" y="254"/>
+                </a:lnTo>
+                <a:cubicBezTo>
+                  <a:pt x="14732" y="210"/>
+                  <a:pt x="14720" y="166"/>
+                  <a:pt x="14698" y="127"/>
+                </a:cubicBezTo>
+                <a:cubicBezTo>
+                  <a:pt x="14676" y="88"/>
+                  <a:pt x="14644" y="56"/>
+                  <a:pt x="14605" y="34"/>
+                </a:cubicBezTo>
+                <a:cubicBezTo>
+                  <a:pt x="14566" y="12"/>
+                  <a:pt x="14522" y="0"/>
+                  <a:pt x="14478" y="0"/>
+                </a:cubicBezTo>
+                <a:lnTo>
+                  <a:pt x="254" y="0"/>
+                </a:lnTo>
+              </a:path>
+            </a:pathLst>
+          </a:custGeom>
+          <a:solidFill>
+            <a:srgbClr val="729fcf"/>
+          </a:solidFill>
+          <a:ln>
+            <a:solidFill>
+              <a:srgbClr val="3465a4"/>
+            </a:solidFill>
+          </a:ln>
+        </p:spPr>
+        <p:style>
+          <a:lnRef idx="0"/>
+          <a:fillRef idx="0"/>
+          <a:effectRef idx="0"/>
+          <a:fontRef idx="minor"/>
+        </p:style>
+        <p:txBody>
+          <a:bodyPr wrap="none" lIns="90000" rIns="90000" tIns="45000" bIns="45000">
+            <a:noAutofit/>
+          </a:bodyPr>
+          <a:p>
+            <a:pPr algn="ctr">
+              <a:lnSpc>
+                <a:spcPct val="100000"/>
+              </a:lnSpc>
+            </a:pPr>
+            <a:r>
+              <a:rPr b="0" lang="en-US" sz="1800" spc="-1" strike="noStrike">
+                <a:solidFill>
+                  <a:srgbClr val="000000"/>
+                </a:solidFill>
+                <a:latin typeface="Arial"/>
+                <a:ea typeface="DejaVu Sans"/>
+              </a:rPr>
+              <a:t>RemoteControl-</a:t>
+            </a:r>
+            <a:endParaRPr b="0" lang="en-US" sz="1800" spc="-1" strike="noStrike">
+              <a:latin typeface="Arial"/>
+            </a:endParaRPr>
+          </a:p>
+          <a:p>
+            <a:pPr algn="ctr">
+              <a:lnSpc>
+                <a:spcPct val="100000"/>
+              </a:lnSpc>
+            </a:pPr>
+            <a:r>
+              <a:rPr b="0" lang="en-US" sz="1800" spc="-1" strike="noStrike">
+                <a:solidFill>
+                  <a:srgbClr val="000000"/>
+                </a:solidFill>
+                <a:latin typeface="Arial"/>
+                <a:ea typeface="DejaVu Sans"/>
+              </a:rPr>
+              <a:t>WebServer</a:t>
+            </a:r>
+            <a:endParaRPr b="0" lang="en-US" sz="1800" spc="-1" strike="noStrike">
+              <a:latin typeface="Arial"/>
+            </a:endParaRPr>
+          </a:p>
+        </p:txBody>
+      </p:sp>
+      <p:sp>
+        <p:nvSpPr>
+          <p:cNvPr id="43" name="CustomShape 2"/>
+          <p:cNvSpPr/>
+          <p:nvPr/>
+        </p:nvSpPr>
+        <p:spPr>
+          <a:xfrm>
+            <a:off x="1920240" y="914400"/>
+            <a:ext cx="1280160" cy="914040"/>
+          </a:xfrm>
+          <a:custGeom>
+            <a:avLst/>
+            <a:gdLst/>
+            <a:ahLst/>
+            <a:rect l="l" t="t" r="r" b="b"/>
+            <a:pathLst>
+              <a:path w="4574" h="3050">
+                <a:moveTo>
+                  <a:pt x="508" y="0"/>
+                </a:moveTo>
+                <a:lnTo>
+                  <a:pt x="508" y="0"/>
+                </a:lnTo>
+                <a:cubicBezTo>
+                  <a:pt x="419" y="0"/>
+                  <a:pt x="331" y="23"/>
+                  <a:pt x="254" y="68"/>
+                </a:cubicBezTo>
+                <a:cubicBezTo>
+                  <a:pt x="177" y="113"/>
+                  <a:pt x="113" y="177"/>
+                  <a:pt x="68" y="254"/>
+                </a:cubicBezTo>
+                <a:cubicBezTo>
+                  <a:pt x="23" y="331"/>
+                  <a:pt x="0" y="419"/>
+                  <a:pt x="0" y="508"/>
+                </a:cubicBezTo>
+                <a:lnTo>
+                  <a:pt x="0" y="2540"/>
+                </a:lnTo>
+                <a:lnTo>
+                  <a:pt x="0" y="2541"/>
+                </a:lnTo>
+                <a:cubicBezTo>
+                  <a:pt x="0" y="2630"/>
+                  <a:pt x="23" y="2718"/>
+                  <a:pt x="68" y="2795"/>
+                </a:cubicBezTo>
+                <a:cubicBezTo>
+                  <a:pt x="113" y="2872"/>
+                  <a:pt x="177" y="2936"/>
+                  <a:pt x="254" y="2981"/>
+                </a:cubicBezTo>
+                <a:cubicBezTo>
+                  <a:pt x="331" y="3026"/>
+                  <a:pt x="419" y="3049"/>
+                  <a:pt x="508" y="3049"/>
+                </a:cubicBezTo>
+                <a:lnTo>
+                  <a:pt x="4064" y="3049"/>
+                </a:lnTo>
+                <a:lnTo>
+                  <a:pt x="4065" y="3049"/>
+                </a:lnTo>
+                <a:cubicBezTo>
+                  <a:pt x="4154" y="3049"/>
+                  <a:pt x="4242" y="3026"/>
+                  <a:pt x="4319" y="2981"/>
+                </a:cubicBezTo>
+                <a:cubicBezTo>
+                  <a:pt x="4396" y="2936"/>
+                  <a:pt x="4460" y="2872"/>
+                  <a:pt x="4505" y="2795"/>
+                </a:cubicBezTo>
+                <a:cubicBezTo>
+                  <a:pt x="4550" y="2718"/>
+                  <a:pt x="4573" y="2630"/>
+                  <a:pt x="4573" y="2541"/>
+                </a:cubicBezTo>
+                <a:lnTo>
+                  <a:pt x="4573" y="508"/>
+                </a:lnTo>
+                <a:lnTo>
+                  <a:pt x="4573" y="508"/>
+                </a:lnTo>
+                <a:lnTo>
+                  <a:pt x="4573" y="508"/>
+                </a:lnTo>
+                <a:cubicBezTo>
+                  <a:pt x="4573" y="419"/>
+                  <a:pt x="4550" y="331"/>
+                  <a:pt x="4505" y="254"/>
+                </a:cubicBezTo>
+                <a:cubicBezTo>
+                  <a:pt x="4460" y="177"/>
+                  <a:pt x="4396" y="113"/>
+                  <a:pt x="4319" y="68"/>
+                </a:cubicBezTo>
+                <a:cubicBezTo>
+                  <a:pt x="4242" y="23"/>
+                  <a:pt x="4154" y="0"/>
+                  <a:pt x="4065" y="0"/>
+                </a:cubicBezTo>
+                <a:lnTo>
+                  <a:pt x="508" y="0"/>
+                </a:lnTo>
+              </a:path>
+            </a:pathLst>
+          </a:custGeom>
+          <a:solidFill>
+            <a:srgbClr val="729fcf"/>
+          </a:solidFill>
+          <a:ln>
+            <a:solidFill>
+              <a:srgbClr val="3465a4"/>
+            </a:solidFill>
+          </a:ln>
+        </p:spPr>
+        <p:style>
+          <a:lnRef idx="0"/>
+          <a:fillRef idx="0"/>
+          <a:effectRef idx="0"/>
+          <a:fontRef idx="minor"/>
+        </p:style>
+        <p:txBody>
+          <a:bodyPr wrap="none" lIns="90000" rIns="90000" tIns="45000" bIns="45000" anchor="ctr">
+            <a:noAutofit/>
+          </a:bodyPr>
+          <a:p>
+            <a:pPr algn="ctr">
+              <a:lnSpc>
+                <a:spcPct val="100000"/>
+              </a:lnSpc>
+            </a:pPr>
+            <a:r>
+              <a:rPr b="0" lang="en-US" sz="1800" spc="-1" strike="noStrike">
+                <a:solidFill>
+                  <a:srgbClr val="000000"/>
+                </a:solidFill>
+                <a:latin typeface="Arial"/>
+                <a:ea typeface="DejaVu Sans"/>
+              </a:rPr>
+              <a:t>Websocket</a:t>
+            </a:r>
+            <a:endParaRPr b="0" lang="en-US" sz="1800" spc="-1" strike="noStrike">
+              <a:latin typeface="Arial"/>
+            </a:endParaRPr>
+          </a:p>
+        </p:txBody>
+      </p:sp>
+      <p:sp>
+        <p:nvSpPr>
+          <p:cNvPr id="44" name="CustomShape 3"/>
+          <p:cNvSpPr/>
+          <p:nvPr/>
+        </p:nvSpPr>
+        <p:spPr>
+          <a:xfrm>
+            <a:off x="3931920" y="182880"/>
+            <a:ext cx="1828800" cy="1737360"/>
+          </a:xfrm>
+          <a:custGeom>
+            <a:avLst/>
+            <a:gdLst/>
+            <a:ahLst/>
+            <a:rect l="l" t="t" r="r" b="b"/>
+            <a:pathLst>
+              <a:path w="14733" h="1526">
+                <a:moveTo>
+                  <a:pt x="254" y="0"/>
+                </a:moveTo>
+                <a:lnTo>
+                  <a:pt x="254" y="0"/>
+                </a:lnTo>
+                <a:cubicBezTo>
+                  <a:pt x="210" y="0"/>
+                  <a:pt x="166" y="12"/>
+                  <a:pt x="127" y="34"/>
+                </a:cubicBezTo>
+                <a:cubicBezTo>
+                  <a:pt x="88" y="56"/>
+                  <a:pt x="56" y="88"/>
+                  <a:pt x="34" y="127"/>
+                </a:cubicBezTo>
+                <a:cubicBezTo>
+                  <a:pt x="12" y="166"/>
+                  <a:pt x="0" y="210"/>
+                  <a:pt x="0" y="254"/>
+                </a:cubicBezTo>
+                <a:lnTo>
+                  <a:pt x="0" y="1270"/>
+                </a:lnTo>
+                <a:lnTo>
+                  <a:pt x="0" y="1271"/>
+                </a:lnTo>
+                <a:cubicBezTo>
+                  <a:pt x="0" y="1315"/>
+                  <a:pt x="12" y="1359"/>
+                  <a:pt x="34" y="1398"/>
+                </a:cubicBezTo>
+                <a:cubicBezTo>
+                  <a:pt x="56" y="1437"/>
+                  <a:pt x="88" y="1469"/>
+                  <a:pt x="127" y="1491"/>
+                </a:cubicBezTo>
+                <a:cubicBezTo>
+                  <a:pt x="166" y="1513"/>
+                  <a:pt x="210" y="1525"/>
+                  <a:pt x="254" y="1525"/>
+                </a:cubicBezTo>
+                <a:lnTo>
+                  <a:pt x="14477" y="1524"/>
+                </a:lnTo>
+                <a:lnTo>
+                  <a:pt x="14478" y="1525"/>
+                </a:lnTo>
+                <a:cubicBezTo>
+                  <a:pt x="14522" y="1525"/>
+                  <a:pt x="14566" y="1513"/>
+                  <a:pt x="14605" y="1491"/>
+                </a:cubicBezTo>
+                <a:cubicBezTo>
+                  <a:pt x="14644" y="1469"/>
+                  <a:pt x="14676" y="1437"/>
+                  <a:pt x="14698" y="1398"/>
+                </a:cubicBezTo>
+                <a:cubicBezTo>
+                  <a:pt x="14720" y="1359"/>
+                  <a:pt x="14732" y="1315"/>
+                  <a:pt x="14732" y="1271"/>
+                </a:cubicBezTo>
+                <a:lnTo>
+                  <a:pt x="14731" y="254"/>
+                </a:lnTo>
+                <a:lnTo>
+                  <a:pt x="14732" y="254"/>
+                </a:lnTo>
+                <a:lnTo>
+                  <a:pt x="14732" y="254"/>
+                </a:lnTo>
+                <a:cubicBezTo>
+                  <a:pt x="14732" y="210"/>
+                  <a:pt x="14720" y="166"/>
+                  <a:pt x="14698" y="127"/>
+                </a:cubicBezTo>
+                <a:cubicBezTo>
+                  <a:pt x="14676" y="88"/>
+                  <a:pt x="14644" y="56"/>
+                  <a:pt x="14605" y="34"/>
+                </a:cubicBezTo>
+                <a:cubicBezTo>
+                  <a:pt x="14566" y="12"/>
+                  <a:pt x="14522" y="0"/>
+                  <a:pt x="14478" y="0"/>
+                </a:cubicBezTo>
+                <a:lnTo>
+                  <a:pt x="254" y="0"/>
+                </a:lnTo>
+              </a:path>
+            </a:pathLst>
+          </a:custGeom>
+          <a:solidFill>
+            <a:srgbClr val="729fcf"/>
+          </a:solidFill>
+          <a:ln>
+            <a:solidFill>
+              <a:srgbClr val="3465a4"/>
+            </a:solidFill>
+          </a:ln>
+        </p:spPr>
+        <p:style>
+          <a:lnRef idx="0"/>
+          <a:fillRef idx="0"/>
+          <a:effectRef idx="0"/>
+          <a:fontRef idx="minor"/>
+        </p:style>
+        <p:txBody>
+          <a:bodyPr wrap="none" lIns="90000" rIns="90000" tIns="45000" bIns="45000" anchor="ctr">
+            <a:noAutofit/>
+          </a:bodyPr>
+          <a:p>
+            <a:pPr algn="ctr">
+              <a:lnSpc>
+                <a:spcPct val="100000"/>
+              </a:lnSpc>
+            </a:pPr>
+            <a:r>
+              <a:rPr b="0" lang="en-US" sz="1800" spc="-1" strike="noStrike">
+                <a:solidFill>
+                  <a:srgbClr val="000000"/>
+                </a:solidFill>
+                <a:latin typeface="Arial"/>
+                <a:ea typeface="DejaVu Sans"/>
+              </a:rPr>
+              <a:t>RemoteControl-</a:t>
+            </a:r>
+            <a:endParaRPr b="0" lang="en-US" sz="1800" spc="-1" strike="noStrike">
+              <a:latin typeface="Arial"/>
+            </a:endParaRPr>
+          </a:p>
+          <a:p>
+            <a:pPr algn="ctr">
+              <a:lnSpc>
+                <a:spcPct val="100000"/>
+              </a:lnSpc>
+            </a:pPr>
+            <a:r>
+              <a:rPr b="0" lang="en-US" sz="1800" spc="-1" strike="noStrike">
+                <a:solidFill>
+                  <a:srgbClr val="000000"/>
+                </a:solidFill>
+                <a:latin typeface="Arial"/>
+                <a:ea typeface="DejaVu Sans"/>
+              </a:rPr>
+              <a:t>Handler</a:t>
+            </a:r>
+            <a:endParaRPr b="0" lang="en-US" sz="1800" spc="-1" strike="noStrike">
+              <a:latin typeface="Arial"/>
+            </a:endParaRPr>
+          </a:p>
+        </p:txBody>
+      </p:sp>
+      <p:sp>
+        <p:nvSpPr>
+          <p:cNvPr id="45" name="CustomShape 4"/>
+          <p:cNvSpPr/>
+          <p:nvPr/>
+        </p:nvSpPr>
+        <p:spPr>
+          <a:xfrm>
+            <a:off x="6035040" y="182880"/>
+            <a:ext cx="1828800" cy="1737360"/>
+          </a:xfrm>
+          <a:custGeom>
+            <a:avLst/>
+            <a:gdLst/>
+            <a:ahLst/>
+            <a:rect l="l" t="t" r="r" b="b"/>
+            <a:pathLst>
+              <a:path w="14733" h="1526">
+                <a:moveTo>
+                  <a:pt x="254" y="0"/>
+                </a:moveTo>
+                <a:lnTo>
+                  <a:pt x="254" y="0"/>
+                </a:lnTo>
+                <a:cubicBezTo>
+                  <a:pt x="210" y="0"/>
+                  <a:pt x="166" y="12"/>
+                  <a:pt x="127" y="34"/>
+                </a:cubicBezTo>
+                <a:cubicBezTo>
+                  <a:pt x="88" y="56"/>
+                  <a:pt x="56" y="88"/>
+                  <a:pt x="34" y="127"/>
+                </a:cubicBezTo>
+                <a:cubicBezTo>
+                  <a:pt x="12" y="166"/>
+                  <a:pt x="0" y="210"/>
+                  <a:pt x="0" y="254"/>
+                </a:cubicBezTo>
+                <a:lnTo>
+                  <a:pt x="0" y="1270"/>
+                </a:lnTo>
+                <a:lnTo>
+                  <a:pt x="0" y="1271"/>
+                </a:lnTo>
+                <a:cubicBezTo>
+                  <a:pt x="0" y="1315"/>
+                  <a:pt x="12" y="1359"/>
+                  <a:pt x="34" y="1398"/>
+                </a:cubicBezTo>
+                <a:cubicBezTo>
+                  <a:pt x="56" y="1437"/>
+                  <a:pt x="88" y="1469"/>
+                  <a:pt x="127" y="1491"/>
+                </a:cubicBezTo>
+                <a:cubicBezTo>
+                  <a:pt x="166" y="1513"/>
+                  <a:pt x="210" y="1525"/>
+                  <a:pt x="254" y="1525"/>
+                </a:cubicBezTo>
+                <a:lnTo>
+                  <a:pt x="14477" y="1524"/>
+                </a:lnTo>
+                <a:lnTo>
+                  <a:pt x="14478" y="1525"/>
+                </a:lnTo>
+                <a:cubicBezTo>
+                  <a:pt x="14522" y="1525"/>
+                  <a:pt x="14566" y="1513"/>
+                  <a:pt x="14605" y="1491"/>
+                </a:cubicBezTo>
+                <a:cubicBezTo>
+                  <a:pt x="14644" y="1469"/>
+                  <a:pt x="14676" y="1437"/>
+                  <a:pt x="14698" y="1398"/>
+                </a:cubicBezTo>
+                <a:cubicBezTo>
+                  <a:pt x="14720" y="1359"/>
+                  <a:pt x="14732" y="1315"/>
+                  <a:pt x="14732" y="1271"/>
+                </a:cubicBezTo>
+                <a:lnTo>
+                  <a:pt x="14731" y="254"/>
+                </a:lnTo>
+                <a:lnTo>
+                  <a:pt x="14732" y="254"/>
+                </a:lnTo>
+                <a:lnTo>
+                  <a:pt x="14732" y="254"/>
+                </a:lnTo>
+                <a:cubicBezTo>
+                  <a:pt x="14732" y="210"/>
+                  <a:pt x="14720" y="166"/>
+                  <a:pt x="14698" y="127"/>
+                </a:cubicBezTo>
+                <a:cubicBezTo>
+                  <a:pt x="14676" y="88"/>
+                  <a:pt x="14644" y="56"/>
+                  <a:pt x="14605" y="34"/>
+                </a:cubicBezTo>
+                <a:cubicBezTo>
+                  <a:pt x="14566" y="12"/>
+                  <a:pt x="14522" y="0"/>
+                  <a:pt x="14478" y="0"/>
+                </a:cubicBezTo>
+                <a:lnTo>
+                  <a:pt x="254" y="0"/>
+                </a:lnTo>
+              </a:path>
+            </a:pathLst>
+          </a:custGeom>
+          <a:solidFill>
+            <a:srgbClr val="729fcf"/>
+          </a:solidFill>
+          <a:ln>
+            <a:solidFill>
+              <a:srgbClr val="3465a4"/>
+            </a:solidFill>
+          </a:ln>
+        </p:spPr>
+        <p:style>
+          <a:lnRef idx="0"/>
+          <a:fillRef idx="0"/>
+          <a:effectRef idx="0"/>
+          <a:fontRef idx="minor"/>
+        </p:style>
+        <p:txBody>
+          <a:bodyPr wrap="none" lIns="90000" rIns="90000" tIns="45000" bIns="45000" anchor="ctr">
+            <a:noAutofit/>
+          </a:bodyPr>
+          <a:p>
+            <a:pPr algn="ctr">
+              <a:lnSpc>
+                <a:spcPct val="100000"/>
+              </a:lnSpc>
+            </a:pPr>
+            <a:r>
+              <a:rPr b="0" lang="en-US" sz="1800" spc="-1" strike="noStrike">
+                <a:solidFill>
+                  <a:srgbClr val="000000"/>
+                </a:solidFill>
+                <a:latin typeface="Arial"/>
+                <a:ea typeface="DejaVu Sans"/>
+              </a:rPr>
+              <a:t>Undo / Redo</a:t>
+            </a:r>
+            <a:endParaRPr b="0" lang="en-US" sz="1800" spc="-1" strike="noStrike">
+              <a:latin typeface="Arial"/>
+            </a:endParaRPr>
+          </a:p>
+        </p:txBody>
+      </p:sp>
+      <p:sp>
+        <p:nvSpPr>
+          <p:cNvPr id="46" name="CustomShape 5"/>
+          <p:cNvSpPr/>
+          <p:nvPr/>
+        </p:nvSpPr>
+        <p:spPr>
+          <a:xfrm>
+            <a:off x="8138160" y="182880"/>
+            <a:ext cx="1828800" cy="1737360"/>
+          </a:xfrm>
+          <a:custGeom>
+            <a:avLst/>
+            <a:gdLst/>
+            <a:ahLst/>
+            <a:rect l="l" t="t" r="r" b="b"/>
+            <a:pathLst>
+              <a:path w="14733" h="1526">
+                <a:moveTo>
+                  <a:pt x="254" y="0"/>
+                </a:moveTo>
+                <a:lnTo>
+                  <a:pt x="254" y="0"/>
+                </a:lnTo>
+                <a:cubicBezTo>
+                  <a:pt x="210" y="0"/>
+                  <a:pt x="166" y="12"/>
+                  <a:pt x="127" y="34"/>
+                </a:cubicBezTo>
+                <a:cubicBezTo>
+                  <a:pt x="88" y="56"/>
+                  <a:pt x="56" y="88"/>
+                  <a:pt x="34" y="127"/>
+                </a:cubicBezTo>
+                <a:cubicBezTo>
+                  <a:pt x="12" y="166"/>
+                  <a:pt x="0" y="210"/>
+                  <a:pt x="0" y="254"/>
+                </a:cubicBezTo>
+                <a:lnTo>
+                  <a:pt x="0" y="1270"/>
+                </a:lnTo>
+                <a:lnTo>
+                  <a:pt x="0" y="1271"/>
+                </a:lnTo>
+                <a:cubicBezTo>
+                  <a:pt x="0" y="1315"/>
+                  <a:pt x="12" y="1359"/>
+                  <a:pt x="34" y="1398"/>
+                </a:cubicBezTo>
+                <a:cubicBezTo>
+                  <a:pt x="56" y="1437"/>
+                  <a:pt x="88" y="1469"/>
+                  <a:pt x="127" y="1491"/>
+                </a:cubicBezTo>
+                <a:cubicBezTo>
+                  <a:pt x="166" y="1513"/>
+                  <a:pt x="210" y="1525"/>
+                  <a:pt x="254" y="1525"/>
+                </a:cubicBezTo>
+                <a:lnTo>
+                  <a:pt x="14477" y="1524"/>
+                </a:lnTo>
+                <a:lnTo>
+                  <a:pt x="14478" y="1525"/>
+                </a:lnTo>
+                <a:cubicBezTo>
+                  <a:pt x="14522" y="1525"/>
+                  <a:pt x="14566" y="1513"/>
+                  <a:pt x="14605" y="1491"/>
+                </a:cubicBezTo>
+                <a:cubicBezTo>
+                  <a:pt x="14644" y="1469"/>
+                  <a:pt x="14676" y="1437"/>
+                  <a:pt x="14698" y="1398"/>
+                </a:cubicBezTo>
+                <a:cubicBezTo>
+                  <a:pt x="14720" y="1359"/>
+                  <a:pt x="14732" y="1315"/>
+                  <a:pt x="14732" y="1271"/>
+                </a:cubicBezTo>
+                <a:lnTo>
+                  <a:pt x="14731" y="254"/>
+                </a:lnTo>
+                <a:lnTo>
+                  <a:pt x="14732" y="254"/>
+                </a:lnTo>
+                <a:lnTo>
+                  <a:pt x="14732" y="254"/>
+                </a:lnTo>
+                <a:cubicBezTo>
+                  <a:pt x="14732" y="210"/>
+                  <a:pt x="14720" y="166"/>
+                  <a:pt x="14698" y="127"/>
+                </a:cubicBezTo>
+                <a:cubicBezTo>
+                  <a:pt x="14676" y="88"/>
+                  <a:pt x="14644" y="56"/>
+                  <a:pt x="14605" y="34"/>
+                </a:cubicBezTo>
+                <a:cubicBezTo>
+                  <a:pt x="14566" y="12"/>
+                  <a:pt x="14522" y="0"/>
+                  <a:pt x="14478" y="0"/>
+                </a:cubicBezTo>
+                <a:lnTo>
+                  <a:pt x="254" y="0"/>
+                </a:lnTo>
+              </a:path>
+            </a:pathLst>
+          </a:custGeom>
+          <a:solidFill>
+            <a:srgbClr val="729fcf"/>
+          </a:solidFill>
+          <a:ln>
+            <a:solidFill>
+              <a:srgbClr val="3465a4"/>
+            </a:solidFill>
+          </a:ln>
+        </p:spPr>
+        <p:style>
+          <a:lnRef idx="0"/>
+          <a:fillRef idx="0"/>
+          <a:effectRef idx="0"/>
+          <a:fontRef idx="minor"/>
+        </p:style>
+        <p:txBody>
+          <a:bodyPr wrap="none" lIns="90000" rIns="90000" tIns="45000" bIns="45000" anchor="ctr">
+            <a:noAutofit/>
+          </a:bodyPr>
+          <a:p>
+            <a:pPr algn="ctr">
+              <a:lnSpc>
+                <a:spcPct val="100000"/>
+              </a:lnSpc>
+            </a:pPr>
+            <a:r>
+              <a:rPr b="0" lang="en-US" sz="1800" spc="-1" strike="noStrike">
+                <a:solidFill>
+                  <a:srgbClr val="000000"/>
+                </a:solidFill>
+                <a:latin typeface="Arial"/>
+                <a:ea typeface="DejaVu Sans"/>
+              </a:rPr>
+              <a:t>MscChart</a:t>
+            </a:r>
+            <a:endParaRPr b="0" lang="en-US" sz="1800" spc="-1" strike="noStrike">
+              <a:latin typeface="Arial"/>
+            </a:endParaRPr>
+          </a:p>
+        </p:txBody>
+      </p:sp>
+      <p:sp>
+        <p:nvSpPr>
+          <p:cNvPr id="47" name="CustomShape 6"/>
+          <p:cNvSpPr/>
+          <p:nvPr/>
+        </p:nvSpPr>
+        <p:spPr>
+          <a:xfrm>
+            <a:off x="274320" y="822960"/>
+            <a:ext cx="1188720" cy="1097280"/>
+          </a:xfrm>
+          <a:custGeom>
+            <a:avLst/>
+            <a:gdLst/>
+            <a:ahLst/>
+            <a:rect l="l" t="t" r="r" b="b"/>
+            <a:pathLst>
+              <a:path w="14733" h="1526">
+                <a:moveTo>
+                  <a:pt x="254" y="0"/>
+                </a:moveTo>
+                <a:lnTo>
+                  <a:pt x="254" y="0"/>
+                </a:lnTo>
+                <a:cubicBezTo>
+                  <a:pt x="210" y="0"/>
+                  <a:pt x="166" y="12"/>
+                  <a:pt x="127" y="34"/>
+                </a:cubicBezTo>
+                <a:cubicBezTo>
+                  <a:pt x="88" y="56"/>
+                  <a:pt x="56" y="88"/>
+                  <a:pt x="34" y="127"/>
+                </a:cubicBezTo>
+                <a:cubicBezTo>
+                  <a:pt x="12" y="166"/>
+                  <a:pt x="0" y="210"/>
+                  <a:pt x="0" y="254"/>
+                </a:cubicBezTo>
+                <a:lnTo>
+                  <a:pt x="0" y="1270"/>
+                </a:lnTo>
+                <a:lnTo>
+                  <a:pt x="0" y="1271"/>
+                </a:lnTo>
+                <a:cubicBezTo>
+                  <a:pt x="0" y="1315"/>
+                  <a:pt x="12" y="1359"/>
+                  <a:pt x="34" y="1398"/>
+                </a:cubicBezTo>
+                <a:cubicBezTo>
+                  <a:pt x="56" y="1437"/>
+                  <a:pt x="88" y="1469"/>
+                  <a:pt x="127" y="1491"/>
+                </a:cubicBezTo>
+                <a:cubicBezTo>
+                  <a:pt x="166" y="1513"/>
+                  <a:pt x="210" y="1525"/>
+                  <a:pt x="254" y="1525"/>
+                </a:cubicBezTo>
+                <a:lnTo>
+                  <a:pt x="14477" y="1524"/>
+                </a:lnTo>
+                <a:lnTo>
+                  <a:pt x="14478" y="1525"/>
+                </a:lnTo>
+                <a:cubicBezTo>
+                  <a:pt x="14522" y="1525"/>
+                  <a:pt x="14566" y="1513"/>
+                  <a:pt x="14605" y="1491"/>
+                </a:cubicBezTo>
+                <a:cubicBezTo>
+                  <a:pt x="14644" y="1469"/>
+                  <a:pt x="14676" y="1437"/>
+                  <a:pt x="14698" y="1398"/>
+                </a:cubicBezTo>
+                <a:cubicBezTo>
+                  <a:pt x="14720" y="1359"/>
+                  <a:pt x="14732" y="1315"/>
+                  <a:pt x="14732" y="1271"/>
+                </a:cubicBezTo>
+                <a:lnTo>
+                  <a:pt x="14731" y="254"/>
+                </a:lnTo>
+                <a:lnTo>
+                  <a:pt x="14732" y="254"/>
+                </a:lnTo>
+                <a:lnTo>
+                  <a:pt x="14732" y="254"/>
+                </a:lnTo>
+                <a:cubicBezTo>
+                  <a:pt x="14732" y="210"/>
+                  <a:pt x="14720" y="166"/>
+                  <a:pt x="14698" y="127"/>
+                </a:cubicBezTo>
+                <a:cubicBezTo>
+                  <a:pt x="14676" y="88"/>
+                  <a:pt x="14644" y="56"/>
+                  <a:pt x="14605" y="34"/>
+                </a:cubicBezTo>
+                <a:cubicBezTo>
+                  <a:pt x="14566" y="12"/>
+                  <a:pt x="14522" y="0"/>
+                  <a:pt x="14478" y="0"/>
+                </a:cubicBezTo>
+                <a:lnTo>
+                  <a:pt x="254" y="0"/>
+                </a:lnTo>
+              </a:path>
+            </a:pathLst>
+          </a:custGeom>
+          <a:solidFill>
+            <a:srgbClr val="ffffff"/>
+          </a:solidFill>
+          <a:ln>
+            <a:solidFill>
+              <a:srgbClr val="3465a4"/>
+            </a:solidFill>
+          </a:ln>
+        </p:spPr>
+        <p:style>
+          <a:lnRef idx="0"/>
+          <a:fillRef idx="0"/>
+          <a:effectRef idx="0"/>
+          <a:fontRef idx="minor"/>
+        </p:style>
+        <p:txBody>
+          <a:bodyPr wrap="none" lIns="90000" rIns="90000" tIns="45000" bIns="45000" anchor="ctr">
+            <a:noAutofit/>
+          </a:bodyPr>
+          <a:p>
+            <a:pPr algn="ctr">
+              <a:lnSpc>
+                <a:spcPct val="100000"/>
+              </a:lnSpc>
+            </a:pPr>
+            <a:r>
+              <a:rPr b="0" lang="en-US" sz="1800" spc="-1" strike="noStrike">
+                <a:solidFill>
+                  <a:srgbClr val="000000"/>
+                </a:solidFill>
+                <a:latin typeface="Arial"/>
+                <a:ea typeface="DejaVu Sans"/>
+              </a:rPr>
+              <a:t>JSON</a:t>
+            </a:r>
+            <a:endParaRPr b="0" lang="en-US" sz="1800" spc="-1" strike="noStrike">
+              <a:latin typeface="Arial"/>
+            </a:endParaRPr>
+          </a:p>
+        </p:txBody>
+      </p:sp>
+      <p:sp>
+        <p:nvSpPr>
+          <p:cNvPr id="48" name="CustomShape 7"/>
+          <p:cNvSpPr/>
+          <p:nvPr/>
+        </p:nvSpPr>
+        <p:spPr>
+          <a:xfrm>
+            <a:off x="1280160" y="1188360"/>
+            <a:ext cx="640080" cy="457200"/>
+          </a:xfrm>
+          <a:custGeom>
+            <a:avLst/>
+            <a:gdLst/>
+            <a:ahLst/>
+            <a:rect l="0" t="0" r="r" b="b"/>
+            <a:pathLst>
+              <a:path w="1780" h="1272">
+                <a:moveTo>
+                  <a:pt x="0" y="954"/>
+                </a:moveTo>
+                <a:lnTo>
+                  <a:pt x="1334" y="954"/>
+                </a:lnTo>
+                <a:lnTo>
+                  <a:pt x="1334" y="1271"/>
+                </a:lnTo>
+                <a:lnTo>
+                  <a:pt x="1779" y="636"/>
+                </a:lnTo>
+                <a:lnTo>
+                  <a:pt x="1334" y="0"/>
+                </a:lnTo>
+                <a:lnTo>
+                  <a:pt x="1334" y="318"/>
+                </a:lnTo>
+                <a:lnTo>
+                  <a:pt x="0" y="318"/>
+                </a:lnTo>
+                <a:lnTo>
+                  <a:pt x="0" y="954"/>
+                </a:lnTo>
+              </a:path>
+            </a:pathLst>
+          </a:custGeom>
+          <a:solidFill>
+            <a:srgbClr val="000000"/>
+          </a:solidFill>
+          <a:ln w="38160">
+            <a:solidFill>
+              <a:srgbClr val="000000"/>
+            </a:solidFill>
+            <a:round/>
+            <a:tailEnd len="med" type="triangle" w="med"/>
+          </a:ln>
+        </p:spPr>
+        <p:style>
+          <a:lnRef idx="0"/>
+          <a:fillRef idx="0"/>
+          <a:effectRef idx="0"/>
+          <a:fontRef idx="minor"/>
+        </p:style>
+      </p:sp>
+      <p:sp>
+        <p:nvSpPr>
+          <p:cNvPr id="49" name="CustomShape 8"/>
+          <p:cNvSpPr/>
+          <p:nvPr/>
+        </p:nvSpPr>
+        <p:spPr>
+          <a:xfrm>
+            <a:off x="3566160" y="1188360"/>
+            <a:ext cx="640080" cy="457200"/>
+          </a:xfrm>
+          <a:custGeom>
+            <a:avLst/>
+            <a:gdLst/>
+            <a:ahLst/>
+            <a:rect l="0" t="0" r="r" b="b"/>
+            <a:pathLst>
+              <a:path w="1780" h="1272">
+                <a:moveTo>
+                  <a:pt x="0" y="954"/>
+                </a:moveTo>
+                <a:lnTo>
+                  <a:pt x="1334" y="954"/>
+                </a:lnTo>
+                <a:lnTo>
+                  <a:pt x="1334" y="1271"/>
+                </a:lnTo>
+                <a:lnTo>
+                  <a:pt x="1779" y="636"/>
+                </a:lnTo>
+                <a:lnTo>
+                  <a:pt x="1334" y="0"/>
+                </a:lnTo>
+                <a:lnTo>
+                  <a:pt x="1334" y="318"/>
+                </a:lnTo>
+                <a:lnTo>
+                  <a:pt x="0" y="318"/>
+                </a:lnTo>
+                <a:lnTo>
+                  <a:pt x="0" y="954"/>
+                </a:lnTo>
+              </a:path>
+            </a:pathLst>
+          </a:custGeom>
+          <a:solidFill>
+            <a:srgbClr val="000000"/>
+          </a:solidFill>
+          <a:ln w="38160">
+            <a:solidFill>
+              <a:srgbClr val="000000"/>
+            </a:solidFill>
+            <a:round/>
+            <a:tailEnd len="med" type="triangle" w="med"/>
+          </a:ln>
+        </p:spPr>
+        <p:style>
+          <a:lnRef idx="0"/>
+          <a:fillRef idx="0"/>
+          <a:effectRef idx="0"/>
+          <a:fontRef idx="minor"/>
+        </p:style>
+      </p:sp>
+      <p:sp>
+        <p:nvSpPr>
+          <p:cNvPr id="50" name="CustomShape 9"/>
+          <p:cNvSpPr/>
+          <p:nvPr/>
+        </p:nvSpPr>
+        <p:spPr>
+          <a:xfrm>
+            <a:off x="5669280" y="1188360"/>
+            <a:ext cx="640080" cy="457200"/>
+          </a:xfrm>
+          <a:custGeom>
+            <a:avLst/>
+            <a:gdLst/>
+            <a:ahLst/>
+            <a:rect l="0" t="0" r="r" b="b"/>
+            <a:pathLst>
+              <a:path w="1780" h="1272">
+                <a:moveTo>
+                  <a:pt x="0" y="954"/>
+                </a:moveTo>
+                <a:lnTo>
+                  <a:pt x="1334" y="954"/>
+                </a:lnTo>
+                <a:lnTo>
+                  <a:pt x="1334" y="1271"/>
+                </a:lnTo>
+                <a:lnTo>
+                  <a:pt x="1779" y="636"/>
+                </a:lnTo>
+                <a:lnTo>
+                  <a:pt x="1334" y="0"/>
+                </a:lnTo>
+                <a:lnTo>
+                  <a:pt x="1334" y="318"/>
+                </a:lnTo>
+                <a:lnTo>
+                  <a:pt x="0" y="318"/>
+                </a:lnTo>
+                <a:lnTo>
+                  <a:pt x="0" y="954"/>
+                </a:lnTo>
+              </a:path>
+            </a:pathLst>
+          </a:custGeom>
+          <a:solidFill>
+            <a:srgbClr val="000000"/>
+          </a:solidFill>
+          <a:ln w="38160">
+            <a:solidFill>
+              <a:srgbClr val="000000"/>
+            </a:solidFill>
+            <a:round/>
+            <a:tailEnd len="med" type="triangle" w="med"/>
+          </a:ln>
+        </p:spPr>
+        <p:style>
+          <a:lnRef idx="0"/>
+          <a:fillRef idx="0"/>
+          <a:effectRef idx="0"/>
+          <a:fontRef idx="minor"/>
+        </p:style>
+      </p:sp>
+      <p:sp>
+        <p:nvSpPr>
+          <p:cNvPr id="51" name="CustomShape 10"/>
+          <p:cNvSpPr/>
+          <p:nvPr/>
+        </p:nvSpPr>
+        <p:spPr>
+          <a:xfrm>
+            <a:off x="7772400" y="1188360"/>
+            <a:ext cx="640080" cy="457200"/>
+          </a:xfrm>
+          <a:custGeom>
+            <a:avLst/>
+            <a:gdLst/>
+            <a:ahLst/>
+            <a:rect l="0" t="0" r="r" b="b"/>
+            <a:pathLst>
+              <a:path w="1780" h="1272">
+                <a:moveTo>
+                  <a:pt x="0" y="954"/>
+                </a:moveTo>
+                <a:lnTo>
+                  <a:pt x="1334" y="954"/>
+                </a:lnTo>
+                <a:lnTo>
+                  <a:pt x="1334" y="1271"/>
+                </a:lnTo>
+                <a:lnTo>
+                  <a:pt x="1779" y="636"/>
+                </a:lnTo>
+                <a:lnTo>
+                  <a:pt x="1334" y="0"/>
+                </a:lnTo>
+                <a:lnTo>
+                  <a:pt x="1334" y="318"/>
+                </a:lnTo>
+                <a:lnTo>
+                  <a:pt x="0" y="318"/>
+                </a:lnTo>
+                <a:lnTo>
+                  <a:pt x="0" y="954"/>
+                </a:lnTo>
+              </a:path>
+            </a:pathLst>
+          </a:custGeom>
+          <a:solidFill>
+            <a:srgbClr val="000000"/>
+          </a:solidFill>
+          <a:ln w="38160">
+            <a:solidFill>
+              <a:srgbClr val="000000"/>
+            </a:solidFill>
+            <a:round/>
+            <a:tailEnd len="med" type="triangle" w="med"/>
+          </a:ln>
+        </p:spPr>
+        <p:style>
+          <a:lnRef idx="0"/>
+          <a:fillRef idx="0"/>
+          <a:effectRef idx="0"/>
+          <a:fontRef idx="minor"/>
+        </p:style>
       </p:sp>
     </p:spTree>
   </p:cSld>

</xml_diff>

<commit_message>
505 Update architecture doc to include the deployment view
</commit_message>
<xml_diff>
--- a/doc/images/architecture_pics.pptx
+++ b/doc/images/architecture_pics.pptx
@@ -65,7 +65,7 @@
         <p:spPr>
           <a:xfrm>
             <a:off x="504000" y="226080"/>
-            <a:ext cx="9070920" cy="945720"/>
+            <a:ext cx="9072000" cy="946440"/>
           </a:xfrm>
           <a:prstGeom prst="rect">
             <a:avLst/>
@@ -96,7 +96,7 @@
         <p:spPr>
           <a:xfrm>
             <a:off x="504000" y="1326600"/>
-            <a:ext cx="9071640" cy="1568160"/>
+            <a:ext cx="9072000" cy="1568520"/>
           </a:xfrm>
           <a:prstGeom prst="rect">
             <a:avLst/>
@@ -125,8 +125,8 @@
         </p:nvSpPr>
         <p:spPr>
           <a:xfrm>
-            <a:off x="504000" y="3044160"/>
-            <a:ext cx="9071640" cy="1568160"/>
+            <a:off x="504000" y="3044520"/>
+            <a:ext cx="9072000" cy="1568520"/>
           </a:xfrm>
           <a:prstGeom prst="rect">
             <a:avLst/>
@@ -178,7 +178,7 @@
         <p:spPr>
           <a:xfrm>
             <a:off x="504000" y="226080"/>
-            <a:ext cx="9070920" cy="945720"/>
+            <a:ext cx="9072000" cy="946440"/>
           </a:xfrm>
           <a:prstGeom prst="rect">
             <a:avLst/>
@@ -209,7 +209,7 @@
         <p:spPr>
           <a:xfrm>
             <a:off x="504000" y="1326600"/>
-            <a:ext cx="4426920" cy="1568160"/>
+            <a:ext cx="4426920" cy="1568520"/>
           </a:xfrm>
           <a:prstGeom prst="rect">
             <a:avLst/>
@@ -239,7 +239,7 @@
         <p:spPr>
           <a:xfrm>
             <a:off x="5152680" y="1326600"/>
-            <a:ext cx="4426920" cy="1568160"/>
+            <a:ext cx="4426920" cy="1568520"/>
           </a:xfrm>
           <a:prstGeom prst="rect">
             <a:avLst/>
@@ -268,8 +268,8 @@
         </p:nvSpPr>
         <p:spPr>
           <a:xfrm>
-            <a:off x="504000" y="3044160"/>
-            <a:ext cx="4426920" cy="1568160"/>
+            <a:off x="504000" y="3044520"/>
+            <a:ext cx="4426920" cy="1568520"/>
           </a:xfrm>
           <a:prstGeom prst="rect">
             <a:avLst/>
@@ -298,8 +298,8 @@
         </p:nvSpPr>
         <p:spPr>
           <a:xfrm>
-            <a:off x="5152680" y="3044160"/>
-            <a:ext cx="4426920" cy="1568160"/>
+            <a:off x="5152680" y="3044520"/>
+            <a:ext cx="4426920" cy="1568520"/>
           </a:xfrm>
           <a:prstGeom prst="rect">
             <a:avLst/>
@@ -351,7 +351,7 @@
         <p:spPr>
           <a:xfrm>
             <a:off x="504000" y="226080"/>
-            <a:ext cx="9070920" cy="945720"/>
+            <a:ext cx="9072000" cy="946440"/>
           </a:xfrm>
           <a:prstGeom prst="rect">
             <a:avLst/>
@@ -382,7 +382,7 @@
         <p:spPr>
           <a:xfrm>
             <a:off x="504000" y="1326600"/>
-            <a:ext cx="2920680" cy="1568160"/>
+            <a:ext cx="2921040" cy="1568520"/>
           </a:xfrm>
           <a:prstGeom prst="rect">
             <a:avLst/>
@@ -411,8 +411,8 @@
         </p:nvSpPr>
         <p:spPr>
           <a:xfrm>
-            <a:off x="3571200" y="1326600"/>
-            <a:ext cx="2920680" cy="1568160"/>
+            <a:off x="3571560" y="1326600"/>
+            <a:ext cx="2921040" cy="1568520"/>
           </a:xfrm>
           <a:prstGeom prst="rect">
             <a:avLst/>
@@ -441,8 +441,8 @@
         </p:nvSpPr>
         <p:spPr>
           <a:xfrm>
-            <a:off x="6638040" y="1326600"/>
-            <a:ext cx="2920680" cy="1568160"/>
+            <a:off x="6639120" y="1326600"/>
+            <a:ext cx="2921040" cy="1568520"/>
           </a:xfrm>
           <a:prstGeom prst="rect">
             <a:avLst/>
@@ -471,8 +471,8 @@
         </p:nvSpPr>
         <p:spPr>
           <a:xfrm>
-            <a:off x="504000" y="3044160"/>
-            <a:ext cx="2920680" cy="1568160"/>
+            <a:off x="504000" y="3044520"/>
+            <a:ext cx="2921040" cy="1568520"/>
           </a:xfrm>
           <a:prstGeom prst="rect">
             <a:avLst/>
@@ -501,8 +501,8 @@
         </p:nvSpPr>
         <p:spPr>
           <a:xfrm>
-            <a:off x="3571200" y="3044160"/>
-            <a:ext cx="2920680" cy="1568160"/>
+            <a:off x="3571560" y="3044520"/>
+            <a:ext cx="2921040" cy="1568520"/>
           </a:xfrm>
           <a:prstGeom prst="rect">
             <a:avLst/>
@@ -531,8 +531,8 @@
         </p:nvSpPr>
         <p:spPr>
           <a:xfrm>
-            <a:off x="6638040" y="3044160"/>
-            <a:ext cx="2920680" cy="1568160"/>
+            <a:off x="6639120" y="3044520"/>
+            <a:ext cx="2921040" cy="1568520"/>
           </a:xfrm>
           <a:prstGeom prst="rect">
             <a:avLst/>
@@ -584,7 +584,7 @@
         <p:spPr>
           <a:xfrm>
             <a:off x="504000" y="226080"/>
-            <a:ext cx="9070920" cy="945720"/>
+            <a:ext cx="9072000" cy="946440"/>
           </a:xfrm>
           <a:prstGeom prst="rect">
             <a:avLst/>
@@ -615,7 +615,7 @@
         <p:spPr>
           <a:xfrm>
             <a:off x="504000" y="1326600"/>
-            <a:ext cx="9071640" cy="3288240"/>
+            <a:ext cx="9072000" cy="3288600"/>
           </a:xfrm>
           <a:prstGeom prst="rect">
             <a:avLst/>
@@ -668,7 +668,7 @@
         <p:spPr>
           <a:xfrm>
             <a:off x="504000" y="226080"/>
-            <a:ext cx="9070920" cy="945720"/>
+            <a:ext cx="9072000" cy="946440"/>
           </a:xfrm>
           <a:prstGeom prst="rect">
             <a:avLst/>
@@ -699,7 +699,7 @@
         <p:spPr>
           <a:xfrm>
             <a:off x="504000" y="1326600"/>
-            <a:ext cx="9071640" cy="3288240"/>
+            <a:ext cx="9072000" cy="3288600"/>
           </a:xfrm>
           <a:prstGeom prst="rect">
             <a:avLst/>
@@ -751,7 +751,7 @@
         <p:spPr>
           <a:xfrm>
             <a:off x="504000" y="226080"/>
-            <a:ext cx="9070920" cy="945720"/>
+            <a:ext cx="9072000" cy="946440"/>
           </a:xfrm>
           <a:prstGeom prst="rect">
             <a:avLst/>
@@ -782,7 +782,7 @@
         <p:spPr>
           <a:xfrm>
             <a:off x="504000" y="1326600"/>
-            <a:ext cx="4426920" cy="3288240"/>
+            <a:ext cx="4426920" cy="3288600"/>
           </a:xfrm>
           <a:prstGeom prst="rect">
             <a:avLst/>
@@ -812,7 +812,7 @@
         <p:spPr>
           <a:xfrm>
             <a:off x="5152680" y="1326600"/>
-            <a:ext cx="4426920" cy="3288240"/>
+            <a:ext cx="4426920" cy="3288600"/>
           </a:xfrm>
           <a:prstGeom prst="rect">
             <a:avLst/>
@@ -864,7 +864,7 @@
         <p:spPr>
           <a:xfrm>
             <a:off x="504000" y="226080"/>
-            <a:ext cx="9070920" cy="945720"/>
+            <a:ext cx="9072000" cy="946440"/>
           </a:xfrm>
           <a:prstGeom prst="rect">
             <a:avLst/>
@@ -917,7 +917,7 @@
         <p:spPr>
           <a:xfrm>
             <a:off x="504000" y="226080"/>
-            <a:ext cx="9070920" cy="4385160"/>
+            <a:ext cx="9072000" cy="4388400"/>
           </a:xfrm>
           <a:prstGeom prst="rect">
             <a:avLst/>
@@ -970,7 +970,7 @@
         <p:spPr>
           <a:xfrm>
             <a:off x="504000" y="226080"/>
-            <a:ext cx="9070920" cy="945720"/>
+            <a:ext cx="9072000" cy="946440"/>
           </a:xfrm>
           <a:prstGeom prst="rect">
             <a:avLst/>
@@ -1001,7 +1001,7 @@
         <p:spPr>
           <a:xfrm>
             <a:off x="504000" y="1326600"/>
-            <a:ext cx="4426920" cy="1568160"/>
+            <a:ext cx="4426920" cy="1568520"/>
           </a:xfrm>
           <a:prstGeom prst="rect">
             <a:avLst/>
@@ -1031,7 +1031,7 @@
         <p:spPr>
           <a:xfrm>
             <a:off x="5152680" y="1326600"/>
-            <a:ext cx="4426920" cy="3288240"/>
+            <a:ext cx="4426920" cy="3288600"/>
           </a:xfrm>
           <a:prstGeom prst="rect">
             <a:avLst/>
@@ -1060,8 +1060,8 @@
         </p:nvSpPr>
         <p:spPr>
           <a:xfrm>
-            <a:off x="504000" y="3044160"/>
-            <a:ext cx="4426920" cy="1568160"/>
+            <a:off x="504000" y="3044520"/>
+            <a:ext cx="4426920" cy="1568520"/>
           </a:xfrm>
           <a:prstGeom prst="rect">
             <a:avLst/>
@@ -1113,7 +1113,7 @@
         <p:spPr>
           <a:xfrm>
             <a:off x="504000" y="226080"/>
-            <a:ext cx="9070920" cy="945720"/>
+            <a:ext cx="9072000" cy="946440"/>
           </a:xfrm>
           <a:prstGeom prst="rect">
             <a:avLst/>
@@ -1144,7 +1144,7 @@
         <p:spPr>
           <a:xfrm>
             <a:off x="504000" y="1326600"/>
-            <a:ext cx="4426920" cy="3288240"/>
+            <a:ext cx="4426920" cy="3288600"/>
           </a:xfrm>
           <a:prstGeom prst="rect">
             <a:avLst/>
@@ -1174,7 +1174,7 @@
         <p:spPr>
           <a:xfrm>
             <a:off x="5152680" y="1326600"/>
-            <a:ext cx="4426920" cy="1568160"/>
+            <a:ext cx="4426920" cy="1568520"/>
           </a:xfrm>
           <a:prstGeom prst="rect">
             <a:avLst/>
@@ -1203,8 +1203,8 @@
         </p:nvSpPr>
         <p:spPr>
           <a:xfrm>
-            <a:off x="5152680" y="3044160"/>
-            <a:ext cx="4426920" cy="1568160"/>
+            <a:off x="5152680" y="3044520"/>
+            <a:ext cx="4426920" cy="1568520"/>
           </a:xfrm>
           <a:prstGeom prst="rect">
             <a:avLst/>
@@ -1256,7 +1256,7 @@
         <p:spPr>
           <a:xfrm>
             <a:off x="504000" y="226080"/>
-            <a:ext cx="9070920" cy="945720"/>
+            <a:ext cx="9072000" cy="946440"/>
           </a:xfrm>
           <a:prstGeom prst="rect">
             <a:avLst/>
@@ -1287,7 +1287,7 @@
         <p:spPr>
           <a:xfrm>
             <a:off x="504000" y="1326600"/>
-            <a:ext cx="4426920" cy="1568160"/>
+            <a:ext cx="4426920" cy="1568520"/>
           </a:xfrm>
           <a:prstGeom prst="rect">
             <a:avLst/>
@@ -1317,7 +1317,7 @@
         <p:spPr>
           <a:xfrm>
             <a:off x="5152680" y="1326600"/>
-            <a:ext cx="4426920" cy="1568160"/>
+            <a:ext cx="4426920" cy="1568520"/>
           </a:xfrm>
           <a:prstGeom prst="rect">
             <a:avLst/>
@@ -1346,8 +1346,8 @@
         </p:nvSpPr>
         <p:spPr>
           <a:xfrm>
-            <a:off x="504000" y="3044160"/>
-            <a:ext cx="9071640" cy="1568160"/>
+            <a:off x="504000" y="3044520"/>
+            <a:ext cx="9072000" cy="1568520"/>
           </a:xfrm>
           <a:prstGeom prst="rect">
             <a:avLst/>
@@ -1399,7 +1399,7 @@
         <p:spPr>
           <a:xfrm>
             <a:off x="504000" y="226080"/>
-            <a:ext cx="9070920" cy="945720"/>
+            <a:ext cx="9072000" cy="946440"/>
           </a:xfrm>
           <a:prstGeom prst="rect">
             <a:avLst/>
@@ -1412,12 +1412,12 @@
           <a:p>
             <a:pPr algn="ctr"/>
             <a:r>
-              <a:rPr b="0" lang="en-US" sz="1800" spc="-1" strike="noStrike">
+              <a:rPr b="0" lang="en-US" sz="4400" spc="-1" strike="noStrike">
                 <a:latin typeface="Arial"/>
               </a:rPr>
               <a:t>Click to edit the title text format</a:t>
             </a:r>
-            <a:endParaRPr b="0" lang="en-US" sz="1800" spc="-1" strike="noStrike">
+            <a:endParaRPr b="0" lang="en-US" sz="4400" spc="-1" strike="noStrike">
               <a:latin typeface="Arial"/>
             </a:endParaRPr>
           </a:p>
@@ -1436,7 +1436,7 @@
         <p:spPr>
           <a:xfrm>
             <a:off x="504000" y="1326600"/>
-            <a:ext cx="9071640" cy="3288240"/>
+            <a:ext cx="9072000" cy="3288600"/>
           </a:xfrm>
           <a:prstGeom prst="rect">
             <a:avLst/>
@@ -1447,7 +1447,7 @@
             <a:normAutofit/>
           </a:bodyPr>
           <a:p>
-            <a:pPr marL="432000" indent="-324000" algn="ctr">
+            <a:pPr marL="432000" indent="-324000">
               <a:spcBef>
                 <a:spcPts val="1417"/>
               </a:spcBef>
@@ -1459,17 +1459,17 @@
               <a:buChar char=""/>
             </a:pPr>
             <a:r>
-              <a:rPr b="0" lang="en-US" sz="1800" spc="-1" strike="noStrike">
+              <a:rPr b="0" lang="en-US" sz="3200" spc="-1" strike="noStrike">
                 <a:latin typeface="Arial"/>
               </a:rPr>
               <a:t>Click to edit the outline text format</a:t>
             </a:r>
-            <a:endParaRPr b="0" lang="en-US" sz="1800" spc="-1" strike="noStrike">
-              <a:latin typeface="Arial"/>
-            </a:endParaRPr>
-          </a:p>
-          <a:p>
-            <a:pPr lvl="1" marL="864000" indent="-324000" algn="ctr">
+            <a:endParaRPr b="0" lang="en-US" sz="3200" spc="-1" strike="noStrike">
+              <a:latin typeface="Arial"/>
+            </a:endParaRPr>
+          </a:p>
+          <a:p>
+            <a:pPr lvl="1" marL="864000" indent="-324000">
               <a:spcBef>
                 <a:spcPts val="1134"/>
               </a:spcBef>
@@ -1481,17 +1481,17 @@
               <a:buChar char=""/>
             </a:pPr>
             <a:r>
-              <a:rPr b="0" lang="en-US" sz="1800" spc="-1" strike="noStrike">
+              <a:rPr b="0" lang="en-US" sz="2800" spc="-1" strike="noStrike">
                 <a:latin typeface="Arial"/>
               </a:rPr>
               <a:t>Second Outline Level</a:t>
             </a:r>
-            <a:endParaRPr b="0" lang="en-US" sz="1800" spc="-1" strike="noStrike">
-              <a:latin typeface="Arial"/>
-            </a:endParaRPr>
-          </a:p>
-          <a:p>
-            <a:pPr lvl="2" marL="1296000" indent="-288000" algn="ctr">
+            <a:endParaRPr b="0" lang="en-US" sz="2800" spc="-1" strike="noStrike">
+              <a:latin typeface="Arial"/>
+            </a:endParaRPr>
+          </a:p>
+          <a:p>
+            <a:pPr lvl="2" marL="1296000" indent="-288000">
               <a:spcBef>
                 <a:spcPts val="850"/>
               </a:spcBef>
@@ -1503,17 +1503,17 @@
               <a:buChar char=""/>
             </a:pPr>
             <a:r>
-              <a:rPr b="0" lang="en-US" sz="1800" spc="-1" strike="noStrike">
+              <a:rPr b="0" lang="en-US" sz="2400" spc="-1" strike="noStrike">
                 <a:latin typeface="Arial"/>
               </a:rPr>
               <a:t>Third Outline Level</a:t>
             </a:r>
-            <a:endParaRPr b="0" lang="en-US" sz="1800" spc="-1" strike="noStrike">
-              <a:latin typeface="Arial"/>
-            </a:endParaRPr>
-          </a:p>
-          <a:p>
-            <a:pPr lvl="3" marL="1728000" indent="-216000" algn="ctr">
+            <a:endParaRPr b="0" lang="en-US" sz="2400" spc="-1" strike="noStrike">
+              <a:latin typeface="Arial"/>
+            </a:endParaRPr>
+          </a:p>
+          <a:p>
+            <a:pPr lvl="3" marL="1728000" indent="-216000">
               <a:spcBef>
                 <a:spcPts val="567"/>
               </a:spcBef>
@@ -1525,17 +1525,17 @@
               <a:buChar char=""/>
             </a:pPr>
             <a:r>
-              <a:rPr b="0" lang="en-US" sz="1800" spc="-1" strike="noStrike">
+              <a:rPr b="0" lang="en-US" sz="2000" spc="-1" strike="noStrike">
                 <a:latin typeface="Arial"/>
               </a:rPr>
               <a:t>Fourth Outline Level</a:t>
             </a:r>
-            <a:endParaRPr b="0" lang="en-US" sz="1800" spc="-1" strike="noStrike">
-              <a:latin typeface="Arial"/>
-            </a:endParaRPr>
-          </a:p>
-          <a:p>
-            <a:pPr lvl="4" marL="2160000" indent="-216000" algn="ctr">
+            <a:endParaRPr b="0" lang="en-US" sz="2000" spc="-1" strike="noStrike">
+              <a:latin typeface="Arial"/>
+            </a:endParaRPr>
+          </a:p>
+          <a:p>
+            <a:pPr lvl="4" marL="2160000" indent="-216000">
               <a:spcBef>
                 <a:spcPts val="283"/>
               </a:spcBef>
@@ -1547,17 +1547,17 @@
               <a:buChar char=""/>
             </a:pPr>
             <a:r>
-              <a:rPr b="0" lang="en-US" sz="1800" spc="-1" strike="noStrike">
+              <a:rPr b="0" lang="en-US" sz="2000" spc="-1" strike="noStrike">
                 <a:latin typeface="Arial"/>
               </a:rPr>
               <a:t>Fifth Outline Level</a:t>
             </a:r>
-            <a:endParaRPr b="0" lang="en-US" sz="1800" spc="-1" strike="noStrike">
-              <a:latin typeface="Arial"/>
-            </a:endParaRPr>
-          </a:p>
-          <a:p>
-            <a:pPr lvl="5" marL="2592000" indent="-216000" algn="ctr">
+            <a:endParaRPr b="0" lang="en-US" sz="2000" spc="-1" strike="noStrike">
+              <a:latin typeface="Arial"/>
+            </a:endParaRPr>
+          </a:p>
+          <a:p>
+            <a:pPr lvl="5" marL="2592000" indent="-216000">
               <a:spcBef>
                 <a:spcPts val="283"/>
               </a:spcBef>
@@ -1569,17 +1569,17 @@
               <a:buChar char=""/>
             </a:pPr>
             <a:r>
-              <a:rPr b="0" lang="en-US" sz="1800" spc="-1" strike="noStrike">
+              <a:rPr b="0" lang="en-US" sz="2000" spc="-1" strike="noStrike">
                 <a:latin typeface="Arial"/>
               </a:rPr>
               <a:t>Sixth Outline Level</a:t>
             </a:r>
-            <a:endParaRPr b="0" lang="en-US" sz="1800" spc="-1" strike="noStrike">
-              <a:latin typeface="Arial"/>
-            </a:endParaRPr>
-          </a:p>
-          <a:p>
-            <a:pPr lvl="6" marL="3024000" indent="-216000" algn="ctr">
+            <a:endParaRPr b="0" lang="en-US" sz="2000" spc="-1" strike="noStrike">
+              <a:latin typeface="Arial"/>
+            </a:endParaRPr>
+          </a:p>
+          <a:p>
+            <a:pPr lvl="6" marL="3024000" indent="-216000">
               <a:spcBef>
                 <a:spcPts val="283"/>
               </a:spcBef>
@@ -1591,12 +1591,12 @@
               <a:buChar char=""/>
             </a:pPr>
             <a:r>
-              <a:rPr b="0" lang="en-US" sz="1800" spc="-1" strike="noStrike">
+              <a:rPr b="0" lang="en-US" sz="2000" spc="-1" strike="noStrike">
                 <a:latin typeface="Arial"/>
               </a:rPr>
               <a:t>Seventh Outline Level</a:t>
             </a:r>
-            <a:endParaRPr b="0" lang="en-US" sz="1800" spc="-1" strike="noStrike">
+            <a:endParaRPr b="0" lang="en-US" sz="2000" spc="-1" strike="noStrike">
               <a:latin typeface="Arial"/>
             </a:endParaRPr>
           </a:p>
@@ -1647,8 +1647,8 @@
         </p:nvSpPr>
         <p:spPr>
           <a:xfrm>
-            <a:off x="640080" y="822960"/>
-            <a:ext cx="1645560" cy="1096920"/>
+            <a:off x="640080" y="1646640"/>
+            <a:ext cx="1645200" cy="1096560"/>
           </a:xfrm>
           <a:custGeom>
             <a:avLst/>
@@ -1753,7 +1753,7 @@
           <a:solidFill>
             <a:srgbClr val="729fcf"/>
           </a:solidFill>
-          <a:ln>
+          <a:ln cap="rnd" w="0">
             <a:solidFill>
               <a:srgbClr val="3465a4"/>
             </a:solidFill>
@@ -1783,7 +1783,27 @@
                 <a:latin typeface="Arial"/>
                 <a:ea typeface="DejaVu Sans"/>
               </a:rPr>
-              <a:t>AADL</a:t>
+              <a:t>Interface</a:t>
+            </a:r>
+            <a:endParaRPr b="0" lang="en-US" sz="1800" spc="-1" strike="noStrike">
+              <a:latin typeface="Arial"/>
+            </a:endParaRPr>
+          </a:p>
+          <a:p>
+            <a:pPr algn="ctr">
+              <a:lnSpc>
+                <a:spcPct val="100000"/>
+              </a:lnSpc>
+            </a:pPr>
+            <a:r>
+              <a:rPr b="0" lang="en-US" sz="1800" spc="-1" strike="noStrike">
+                <a:solidFill>
+                  <a:srgbClr val="000000"/>
+                </a:solidFill>
+                <a:latin typeface="Arial"/>
+                <a:ea typeface="DejaVu Sans"/>
+              </a:rPr>
+              <a:t>View</a:t>
             </a:r>
             <a:endParaRPr b="0" lang="en-US" sz="1800" spc="-1" strike="noStrike">
               <a:latin typeface="Arial"/>
@@ -1819,8 +1839,8 @@
         </p:nvSpPr>
         <p:spPr>
           <a:xfrm>
-            <a:off x="2468880" y="822960"/>
-            <a:ext cx="1645560" cy="1096920"/>
+            <a:off x="2468880" y="1646640"/>
+            <a:ext cx="1645200" cy="1096560"/>
           </a:xfrm>
           <a:custGeom>
             <a:avLst/>
@@ -1925,7 +1945,523 @@
           <a:solidFill>
             <a:srgbClr val="729fcf"/>
           </a:solidFill>
-          <a:ln>
+          <a:ln cap="rnd" w="0">
+            <a:solidFill>
+              <a:srgbClr val="3465a4"/>
+            </a:solidFill>
+          </a:ln>
+        </p:spPr>
+        <p:style>
+          <a:lnRef idx="0"/>
+          <a:fillRef idx="0"/>
+          <a:effectRef idx="0"/>
+          <a:fontRef idx="minor"/>
+        </p:style>
+        <p:txBody>
+          <a:bodyPr wrap="none" lIns="90000" rIns="90000" tIns="45000" bIns="45000" anchor="ctr">
+            <a:noAutofit/>
+          </a:bodyPr>
+          <a:p>
+            <a:pPr algn="ctr">
+              <a:lnSpc>
+                <a:spcPct val="100000"/>
+              </a:lnSpc>
+            </a:pPr>
+            <a:r>
+              <a:rPr b="0" lang="en-US" sz="1800" spc="-1" strike="noStrike">
+                <a:solidFill>
+                  <a:srgbClr val="000000"/>
+                </a:solidFill>
+                <a:latin typeface="Arial"/>
+                <a:ea typeface="DejaVu Sans"/>
+              </a:rPr>
+              <a:t>Deployment</a:t>
+            </a:r>
+            <a:endParaRPr b="0" lang="en-US" sz="1800" spc="-1" strike="noStrike">
+              <a:latin typeface="Arial"/>
+            </a:endParaRPr>
+          </a:p>
+          <a:p>
+            <a:pPr algn="ctr">
+              <a:lnSpc>
+                <a:spcPct val="100000"/>
+              </a:lnSpc>
+            </a:pPr>
+            <a:r>
+              <a:rPr b="0" lang="en-US" sz="1800" spc="-1" strike="noStrike">
+                <a:solidFill>
+                  <a:srgbClr val="000000"/>
+                </a:solidFill>
+                <a:latin typeface="Arial"/>
+                <a:ea typeface="DejaVu Sans"/>
+              </a:rPr>
+              <a:t>View</a:t>
+            </a:r>
+            <a:endParaRPr b="0" lang="en-US" sz="1800" spc="-1" strike="noStrike">
+              <a:latin typeface="Arial"/>
+            </a:endParaRPr>
+          </a:p>
+          <a:p>
+            <a:pPr algn="ctr">
+              <a:lnSpc>
+                <a:spcPct val="100000"/>
+              </a:lnSpc>
+            </a:pPr>
+            <a:r>
+              <a:rPr b="0" lang="en-US" sz="1800" spc="-1" strike="noStrike">
+                <a:solidFill>
+                  <a:srgbClr val="000000"/>
+                </a:solidFill>
+                <a:latin typeface="Arial"/>
+                <a:ea typeface="DejaVu Sans"/>
+              </a:rPr>
+              <a:t>Editor</a:t>
+            </a:r>
+            <a:endParaRPr b="0" lang="en-US" sz="1800" spc="-1" strike="noStrike">
+              <a:latin typeface="Arial"/>
+            </a:endParaRPr>
+          </a:p>
+        </p:txBody>
+      </p:sp>
+      <p:sp>
+        <p:nvSpPr>
+          <p:cNvPr id="40" name="CustomShape 3"/>
+          <p:cNvSpPr/>
+          <p:nvPr/>
+        </p:nvSpPr>
+        <p:spPr>
+          <a:xfrm>
+            <a:off x="4298400" y="1646640"/>
+            <a:ext cx="1645200" cy="1096560"/>
+          </a:xfrm>
+          <a:custGeom>
+            <a:avLst/>
+            <a:gdLst/>
+            <a:ahLst/>
+            <a:rect l="l" t="t" r="r" b="b"/>
+            <a:pathLst>
+              <a:path w="4574" h="3050">
+                <a:moveTo>
+                  <a:pt x="508" y="0"/>
+                </a:moveTo>
+                <a:lnTo>
+                  <a:pt x="508" y="0"/>
+                </a:lnTo>
+                <a:cubicBezTo>
+                  <a:pt x="419" y="0"/>
+                  <a:pt x="331" y="23"/>
+                  <a:pt x="254" y="68"/>
+                </a:cubicBezTo>
+                <a:cubicBezTo>
+                  <a:pt x="177" y="113"/>
+                  <a:pt x="113" y="177"/>
+                  <a:pt x="68" y="254"/>
+                </a:cubicBezTo>
+                <a:cubicBezTo>
+                  <a:pt x="23" y="331"/>
+                  <a:pt x="0" y="419"/>
+                  <a:pt x="0" y="508"/>
+                </a:cubicBezTo>
+                <a:lnTo>
+                  <a:pt x="0" y="2540"/>
+                </a:lnTo>
+                <a:lnTo>
+                  <a:pt x="0" y="2541"/>
+                </a:lnTo>
+                <a:cubicBezTo>
+                  <a:pt x="0" y="2630"/>
+                  <a:pt x="23" y="2718"/>
+                  <a:pt x="68" y="2795"/>
+                </a:cubicBezTo>
+                <a:cubicBezTo>
+                  <a:pt x="113" y="2872"/>
+                  <a:pt x="177" y="2936"/>
+                  <a:pt x="254" y="2981"/>
+                </a:cubicBezTo>
+                <a:cubicBezTo>
+                  <a:pt x="331" y="3026"/>
+                  <a:pt x="419" y="3049"/>
+                  <a:pt x="508" y="3049"/>
+                </a:cubicBezTo>
+                <a:lnTo>
+                  <a:pt x="4064" y="3049"/>
+                </a:lnTo>
+                <a:lnTo>
+                  <a:pt x="4065" y="3049"/>
+                </a:lnTo>
+                <a:cubicBezTo>
+                  <a:pt x="4154" y="3049"/>
+                  <a:pt x="4242" y="3026"/>
+                  <a:pt x="4319" y="2981"/>
+                </a:cubicBezTo>
+                <a:cubicBezTo>
+                  <a:pt x="4396" y="2936"/>
+                  <a:pt x="4460" y="2872"/>
+                  <a:pt x="4505" y="2795"/>
+                </a:cubicBezTo>
+                <a:cubicBezTo>
+                  <a:pt x="4550" y="2718"/>
+                  <a:pt x="4573" y="2630"/>
+                  <a:pt x="4573" y="2541"/>
+                </a:cubicBezTo>
+                <a:lnTo>
+                  <a:pt x="4573" y="508"/>
+                </a:lnTo>
+                <a:lnTo>
+                  <a:pt x="4573" y="508"/>
+                </a:lnTo>
+                <a:lnTo>
+                  <a:pt x="4573" y="508"/>
+                </a:lnTo>
+                <a:cubicBezTo>
+                  <a:pt x="4573" y="419"/>
+                  <a:pt x="4550" y="331"/>
+                  <a:pt x="4505" y="254"/>
+                </a:cubicBezTo>
+                <a:cubicBezTo>
+                  <a:pt x="4460" y="177"/>
+                  <a:pt x="4396" y="113"/>
+                  <a:pt x="4319" y="68"/>
+                </a:cubicBezTo>
+                <a:cubicBezTo>
+                  <a:pt x="4242" y="23"/>
+                  <a:pt x="4154" y="0"/>
+                  <a:pt x="4065" y="0"/>
+                </a:cubicBezTo>
+                <a:lnTo>
+                  <a:pt x="508" y="0"/>
+                </a:lnTo>
+              </a:path>
+            </a:pathLst>
+          </a:custGeom>
+          <a:solidFill>
+            <a:srgbClr val="729fcf"/>
+          </a:solidFill>
+          <a:ln cap="rnd" w="0">
+            <a:solidFill>
+              <a:srgbClr val="3465a4"/>
+            </a:solidFill>
+          </a:ln>
+        </p:spPr>
+        <p:style>
+          <a:lnRef idx="0"/>
+          <a:fillRef idx="0"/>
+          <a:effectRef idx="0"/>
+          <a:fontRef idx="minor"/>
+        </p:style>
+        <p:txBody>
+          <a:bodyPr wrap="none" lIns="90000" rIns="90000" tIns="45000" bIns="45000" anchor="ctr">
+            <a:noAutofit/>
+          </a:bodyPr>
+          <a:p>
+            <a:pPr algn="ctr">
+              <a:lnSpc>
+                <a:spcPct val="100000"/>
+              </a:lnSpc>
+            </a:pPr>
+            <a:r>
+              <a:rPr b="0" lang="en-US" sz="1800" spc="-1" strike="noStrike">
+                <a:solidFill>
+                  <a:srgbClr val="000000"/>
+                </a:solidFill>
+                <a:latin typeface="Arial"/>
+                <a:ea typeface="DejaVu Sans"/>
+              </a:rPr>
+              <a:t>MSC</a:t>
+            </a:r>
+            <a:endParaRPr b="0" lang="en-US" sz="1800" spc="-1" strike="noStrike">
+              <a:latin typeface="Arial"/>
+            </a:endParaRPr>
+          </a:p>
+          <a:p>
+            <a:pPr algn="ctr">
+              <a:lnSpc>
+                <a:spcPct val="100000"/>
+              </a:lnSpc>
+            </a:pPr>
+            <a:r>
+              <a:rPr b="0" lang="en-US" sz="1800" spc="-1" strike="noStrike">
+                <a:solidFill>
+                  <a:srgbClr val="000000"/>
+                </a:solidFill>
+                <a:latin typeface="Arial"/>
+                <a:ea typeface="DejaVu Sans"/>
+              </a:rPr>
+              <a:t>Editor</a:t>
+            </a:r>
+            <a:endParaRPr b="0" lang="en-US" sz="1800" spc="-1" strike="noStrike">
+              <a:latin typeface="Arial"/>
+            </a:endParaRPr>
+          </a:p>
+        </p:txBody>
+      </p:sp>
+      <p:sp>
+        <p:nvSpPr>
+          <p:cNvPr id="41" name="CustomShape 4"/>
+          <p:cNvSpPr/>
+          <p:nvPr/>
+        </p:nvSpPr>
+        <p:spPr>
+          <a:xfrm>
+            <a:off x="641160" y="914400"/>
+            <a:ext cx="5302440" cy="547920"/>
+          </a:xfrm>
+          <a:custGeom>
+            <a:avLst/>
+            <a:gdLst/>
+            <a:ahLst/>
+            <a:rect l="l" t="t" r="r" b="b"/>
+            <a:pathLst>
+              <a:path w="14733" h="1526">
+                <a:moveTo>
+                  <a:pt x="254" y="0"/>
+                </a:moveTo>
+                <a:lnTo>
+                  <a:pt x="254" y="0"/>
+                </a:lnTo>
+                <a:cubicBezTo>
+                  <a:pt x="210" y="0"/>
+                  <a:pt x="166" y="12"/>
+                  <a:pt x="127" y="34"/>
+                </a:cubicBezTo>
+                <a:cubicBezTo>
+                  <a:pt x="88" y="56"/>
+                  <a:pt x="56" y="88"/>
+                  <a:pt x="34" y="127"/>
+                </a:cubicBezTo>
+                <a:cubicBezTo>
+                  <a:pt x="12" y="166"/>
+                  <a:pt x="0" y="210"/>
+                  <a:pt x="0" y="254"/>
+                </a:cubicBezTo>
+                <a:lnTo>
+                  <a:pt x="0" y="1270"/>
+                </a:lnTo>
+                <a:lnTo>
+                  <a:pt x="0" y="1271"/>
+                </a:lnTo>
+                <a:cubicBezTo>
+                  <a:pt x="0" y="1315"/>
+                  <a:pt x="12" y="1359"/>
+                  <a:pt x="34" y="1398"/>
+                </a:cubicBezTo>
+                <a:cubicBezTo>
+                  <a:pt x="56" y="1437"/>
+                  <a:pt x="88" y="1469"/>
+                  <a:pt x="127" y="1491"/>
+                </a:cubicBezTo>
+                <a:cubicBezTo>
+                  <a:pt x="166" y="1513"/>
+                  <a:pt x="210" y="1525"/>
+                  <a:pt x="254" y="1525"/>
+                </a:cubicBezTo>
+                <a:lnTo>
+                  <a:pt x="14477" y="1524"/>
+                </a:lnTo>
+                <a:lnTo>
+                  <a:pt x="14478" y="1525"/>
+                </a:lnTo>
+                <a:cubicBezTo>
+                  <a:pt x="14522" y="1525"/>
+                  <a:pt x="14566" y="1513"/>
+                  <a:pt x="14605" y="1491"/>
+                </a:cubicBezTo>
+                <a:cubicBezTo>
+                  <a:pt x="14644" y="1469"/>
+                  <a:pt x="14676" y="1437"/>
+                  <a:pt x="14698" y="1398"/>
+                </a:cubicBezTo>
+                <a:cubicBezTo>
+                  <a:pt x="14720" y="1359"/>
+                  <a:pt x="14732" y="1315"/>
+                  <a:pt x="14732" y="1271"/>
+                </a:cubicBezTo>
+                <a:lnTo>
+                  <a:pt x="14731" y="254"/>
+                </a:lnTo>
+                <a:lnTo>
+                  <a:pt x="14732" y="254"/>
+                </a:lnTo>
+                <a:lnTo>
+                  <a:pt x="14732" y="254"/>
+                </a:lnTo>
+                <a:cubicBezTo>
+                  <a:pt x="14732" y="210"/>
+                  <a:pt x="14720" y="166"/>
+                  <a:pt x="14698" y="127"/>
+                </a:cubicBezTo>
+                <a:cubicBezTo>
+                  <a:pt x="14676" y="88"/>
+                  <a:pt x="14644" y="56"/>
+                  <a:pt x="14605" y="34"/>
+                </a:cubicBezTo>
+                <a:cubicBezTo>
+                  <a:pt x="14566" y="12"/>
+                  <a:pt x="14522" y="0"/>
+                  <a:pt x="14478" y="0"/>
+                </a:cubicBezTo>
+                <a:lnTo>
+                  <a:pt x="254" y="0"/>
+                </a:lnTo>
+              </a:path>
+            </a:pathLst>
+          </a:custGeom>
+          <a:solidFill>
+            <a:srgbClr val="729fcf"/>
+          </a:solidFill>
+          <a:ln cap="rnd" w="0">
+            <a:solidFill>
+              <a:srgbClr val="3465a4"/>
+            </a:solidFill>
+          </a:ln>
+        </p:spPr>
+        <p:style>
+          <a:lnRef idx="0"/>
+          <a:fillRef idx="0"/>
+          <a:effectRef idx="0"/>
+          <a:fontRef idx="minor"/>
+        </p:style>
+        <p:txBody>
+          <a:bodyPr wrap="none" lIns="90000" rIns="90000" tIns="45000" bIns="45000" anchor="ctr">
+            <a:noAutofit/>
+          </a:bodyPr>
+          <a:p>
+            <a:pPr algn="ctr">
+              <a:lnSpc>
+                <a:spcPct val="100000"/>
+              </a:lnSpc>
+            </a:pPr>
+            <a:r>
+              <a:rPr b="0" lang="en-US" sz="1800" spc="-1" strike="noStrike">
+                <a:solidFill>
+                  <a:srgbClr val="000000"/>
+                </a:solidFill>
+                <a:latin typeface="Arial"/>
+                <a:ea typeface="DejaVu Sans"/>
+              </a:rPr>
+              <a:t>Space Creator plugin</a:t>
+            </a:r>
+            <a:endParaRPr b="0" lang="en-US" sz="1800" spc="-1" strike="noStrike">
+              <a:latin typeface="Arial"/>
+            </a:endParaRPr>
+          </a:p>
+        </p:txBody>
+      </p:sp>
+      <p:sp>
+        <p:nvSpPr>
+          <p:cNvPr id="42" name="CustomShape 2_0"/>
+          <p:cNvSpPr/>
+          <p:nvPr/>
+        </p:nvSpPr>
+        <p:spPr>
+          <a:xfrm>
+            <a:off x="6584400" y="1646640"/>
+            <a:ext cx="1645200" cy="1096560"/>
+          </a:xfrm>
+          <a:custGeom>
+            <a:avLst/>
+            <a:gdLst/>
+            <a:ahLst/>
+            <a:rect l="l" t="t" r="r" b="b"/>
+            <a:pathLst>
+              <a:path w="4574" h="3050">
+                <a:moveTo>
+                  <a:pt x="508" y="0"/>
+                </a:moveTo>
+                <a:lnTo>
+                  <a:pt x="508" y="0"/>
+                </a:lnTo>
+                <a:cubicBezTo>
+                  <a:pt x="419" y="0"/>
+                  <a:pt x="331" y="23"/>
+                  <a:pt x="254" y="68"/>
+                </a:cubicBezTo>
+                <a:cubicBezTo>
+                  <a:pt x="177" y="113"/>
+                  <a:pt x="113" y="177"/>
+                  <a:pt x="68" y="254"/>
+                </a:cubicBezTo>
+                <a:cubicBezTo>
+                  <a:pt x="23" y="331"/>
+                  <a:pt x="0" y="419"/>
+                  <a:pt x="0" y="508"/>
+                </a:cubicBezTo>
+                <a:lnTo>
+                  <a:pt x="0" y="2540"/>
+                </a:lnTo>
+                <a:lnTo>
+                  <a:pt x="0" y="2541"/>
+                </a:lnTo>
+                <a:cubicBezTo>
+                  <a:pt x="0" y="2630"/>
+                  <a:pt x="23" y="2718"/>
+                  <a:pt x="68" y="2795"/>
+                </a:cubicBezTo>
+                <a:cubicBezTo>
+                  <a:pt x="113" y="2872"/>
+                  <a:pt x="177" y="2936"/>
+                  <a:pt x="254" y="2981"/>
+                </a:cubicBezTo>
+                <a:cubicBezTo>
+                  <a:pt x="331" y="3026"/>
+                  <a:pt x="419" y="3049"/>
+                  <a:pt x="508" y="3049"/>
+                </a:cubicBezTo>
+                <a:lnTo>
+                  <a:pt x="4064" y="3049"/>
+                </a:lnTo>
+                <a:lnTo>
+                  <a:pt x="4065" y="3049"/>
+                </a:lnTo>
+                <a:cubicBezTo>
+                  <a:pt x="4154" y="3049"/>
+                  <a:pt x="4242" y="3026"/>
+                  <a:pt x="4319" y="2981"/>
+                </a:cubicBezTo>
+                <a:cubicBezTo>
+                  <a:pt x="4396" y="2936"/>
+                  <a:pt x="4460" y="2872"/>
+                  <a:pt x="4505" y="2795"/>
+                </a:cubicBezTo>
+                <a:cubicBezTo>
+                  <a:pt x="4550" y="2718"/>
+                  <a:pt x="4573" y="2630"/>
+                  <a:pt x="4573" y="2541"/>
+                </a:cubicBezTo>
+                <a:lnTo>
+                  <a:pt x="4573" y="508"/>
+                </a:lnTo>
+                <a:lnTo>
+                  <a:pt x="4573" y="508"/>
+                </a:lnTo>
+                <a:lnTo>
+                  <a:pt x="4573" y="508"/>
+                </a:lnTo>
+                <a:cubicBezTo>
+                  <a:pt x="4573" y="419"/>
+                  <a:pt x="4550" y="331"/>
+                  <a:pt x="4505" y="254"/>
+                </a:cubicBezTo>
+                <a:cubicBezTo>
+                  <a:pt x="4460" y="177"/>
+                  <a:pt x="4396" y="113"/>
+                  <a:pt x="4319" y="68"/>
+                </a:cubicBezTo>
+                <a:cubicBezTo>
+                  <a:pt x="4242" y="23"/>
+                  <a:pt x="4154" y="0"/>
+                  <a:pt x="4065" y="0"/>
+                </a:cubicBezTo>
+                <a:lnTo>
+                  <a:pt x="508" y="0"/>
+                </a:lnTo>
+              </a:path>
+            </a:pathLst>
+          </a:custGeom>
+          <a:solidFill>
+            <a:srgbClr val="729fcf"/>
+          </a:solidFill>
+          <a:ln cap="rnd" w="0">
             <a:solidFill>
               <a:srgbClr val="3465a4"/>
             </a:solidFill>
@@ -1985,14 +2521,14 @@
       </p:sp>
       <p:sp>
         <p:nvSpPr>
-          <p:cNvPr id="40" name="CustomShape 3"/>
+          <p:cNvPr id="43" name="CustomShape 4_0"/>
           <p:cNvSpPr/>
           <p:nvPr/>
         </p:nvSpPr>
         <p:spPr>
           <a:xfrm>
-            <a:off x="4297680" y="822960"/>
-            <a:ext cx="1645560" cy="1096920"/>
+            <a:off x="685800" y="137880"/>
+            <a:ext cx="7588440" cy="547920"/>
           </a:xfrm>
           <a:custGeom>
             <a:avLst/>
@@ -2000,96 +2536,96 @@
             <a:ahLst/>
             <a:rect l="l" t="t" r="r" b="b"/>
             <a:pathLst>
-              <a:path w="4574" h="3050">
+              <a:path w="14733" h="1526">
                 <a:moveTo>
-                  <a:pt x="508" y="0"/>
+                  <a:pt x="254" y="0"/>
                 </a:moveTo>
                 <a:lnTo>
-                  <a:pt x="508" y="0"/>
-                </a:lnTo>
-                <a:cubicBezTo>
-                  <a:pt x="419" y="0"/>
-                  <a:pt x="331" y="23"/>
-                  <a:pt x="254" y="68"/>
-                </a:cubicBezTo>
-                <a:cubicBezTo>
-                  <a:pt x="177" y="113"/>
-                  <a:pt x="113" y="177"/>
-                  <a:pt x="68" y="254"/>
-                </a:cubicBezTo>
-                <a:cubicBezTo>
-                  <a:pt x="23" y="331"/>
-                  <a:pt x="0" y="419"/>
-                  <a:pt x="0" y="508"/>
-                </a:cubicBezTo>
-                <a:lnTo>
-                  <a:pt x="0" y="2540"/>
-                </a:lnTo>
-                <a:lnTo>
-                  <a:pt x="0" y="2541"/>
-                </a:lnTo>
-                <a:cubicBezTo>
-                  <a:pt x="0" y="2630"/>
-                  <a:pt x="23" y="2718"/>
-                  <a:pt x="68" y="2795"/>
-                </a:cubicBezTo>
-                <a:cubicBezTo>
-                  <a:pt x="113" y="2872"/>
-                  <a:pt x="177" y="2936"/>
-                  <a:pt x="254" y="2981"/>
-                </a:cubicBezTo>
-                <a:cubicBezTo>
-                  <a:pt x="331" y="3026"/>
-                  <a:pt x="419" y="3049"/>
-                  <a:pt x="508" y="3049"/>
-                </a:cubicBezTo>
-                <a:lnTo>
-                  <a:pt x="4064" y="3049"/>
-                </a:lnTo>
-                <a:lnTo>
-                  <a:pt x="4065" y="3049"/>
-                </a:lnTo>
-                <a:cubicBezTo>
-                  <a:pt x="4154" y="3049"/>
-                  <a:pt x="4242" y="3026"/>
-                  <a:pt x="4319" y="2981"/>
-                </a:cubicBezTo>
-                <a:cubicBezTo>
-                  <a:pt x="4396" y="2936"/>
-                  <a:pt x="4460" y="2872"/>
-                  <a:pt x="4505" y="2795"/>
-                </a:cubicBezTo>
-                <a:cubicBezTo>
-                  <a:pt x="4550" y="2718"/>
-                  <a:pt x="4573" y="2630"/>
-                  <a:pt x="4573" y="2541"/>
-                </a:cubicBezTo>
-                <a:lnTo>
-                  <a:pt x="4573" y="508"/>
-                </a:lnTo>
-                <a:lnTo>
-                  <a:pt x="4573" y="508"/>
-                </a:lnTo>
-                <a:lnTo>
-                  <a:pt x="4573" y="508"/>
-                </a:lnTo>
-                <a:cubicBezTo>
-                  <a:pt x="4573" y="419"/>
-                  <a:pt x="4550" y="331"/>
-                  <a:pt x="4505" y="254"/>
-                </a:cubicBezTo>
-                <a:cubicBezTo>
-                  <a:pt x="4460" y="177"/>
-                  <a:pt x="4396" y="113"/>
-                  <a:pt x="4319" y="68"/>
-                </a:cubicBezTo>
-                <a:cubicBezTo>
-                  <a:pt x="4242" y="23"/>
-                  <a:pt x="4154" y="0"/>
-                  <a:pt x="4065" y="0"/>
-                </a:cubicBezTo>
-                <a:lnTo>
-                  <a:pt x="508" y="0"/>
+                  <a:pt x="254" y="0"/>
+                </a:lnTo>
+                <a:cubicBezTo>
+                  <a:pt x="210" y="0"/>
+                  <a:pt x="166" y="12"/>
+                  <a:pt x="127" y="34"/>
+                </a:cubicBezTo>
+                <a:cubicBezTo>
+                  <a:pt x="88" y="56"/>
+                  <a:pt x="56" y="88"/>
+                  <a:pt x="34" y="127"/>
+                </a:cubicBezTo>
+                <a:cubicBezTo>
+                  <a:pt x="12" y="166"/>
+                  <a:pt x="0" y="210"/>
+                  <a:pt x="0" y="254"/>
+                </a:cubicBezTo>
+                <a:lnTo>
+                  <a:pt x="0" y="1270"/>
+                </a:lnTo>
+                <a:lnTo>
+                  <a:pt x="0" y="1271"/>
+                </a:lnTo>
+                <a:cubicBezTo>
+                  <a:pt x="0" y="1315"/>
+                  <a:pt x="12" y="1359"/>
+                  <a:pt x="34" y="1398"/>
+                </a:cubicBezTo>
+                <a:cubicBezTo>
+                  <a:pt x="56" y="1437"/>
+                  <a:pt x="88" y="1469"/>
+                  <a:pt x="127" y="1491"/>
+                </a:cubicBezTo>
+                <a:cubicBezTo>
+                  <a:pt x="166" y="1513"/>
+                  <a:pt x="210" y="1525"/>
+                  <a:pt x="254" y="1525"/>
+                </a:cubicBezTo>
+                <a:lnTo>
+                  <a:pt x="14477" y="1524"/>
+                </a:lnTo>
+                <a:lnTo>
+                  <a:pt x="14478" y="1525"/>
+                </a:lnTo>
+                <a:cubicBezTo>
+                  <a:pt x="14522" y="1525"/>
+                  <a:pt x="14566" y="1513"/>
+                  <a:pt x="14605" y="1491"/>
+                </a:cubicBezTo>
+                <a:cubicBezTo>
+                  <a:pt x="14644" y="1469"/>
+                  <a:pt x="14676" y="1437"/>
+                  <a:pt x="14698" y="1398"/>
+                </a:cubicBezTo>
+                <a:cubicBezTo>
+                  <a:pt x="14720" y="1359"/>
+                  <a:pt x="14732" y="1315"/>
+                  <a:pt x="14732" y="1271"/>
+                </a:cubicBezTo>
+                <a:lnTo>
+                  <a:pt x="14731" y="254"/>
+                </a:lnTo>
+                <a:lnTo>
+                  <a:pt x="14732" y="254"/>
+                </a:lnTo>
+                <a:lnTo>
+                  <a:pt x="14732" y="254"/>
+                </a:lnTo>
+                <a:cubicBezTo>
+                  <a:pt x="14732" y="210"/>
+                  <a:pt x="14720" y="166"/>
+                  <a:pt x="14698" y="127"/>
+                </a:cubicBezTo>
+                <a:cubicBezTo>
+                  <a:pt x="14676" y="88"/>
+                  <a:pt x="14644" y="56"/>
+                  <a:pt x="14605" y="34"/>
+                </a:cubicBezTo>
+                <a:cubicBezTo>
+                  <a:pt x="14566" y="12"/>
+                  <a:pt x="14522" y="0"/>
+                  <a:pt x="14478" y="0"/>
+                </a:cubicBezTo>
+                <a:lnTo>
+                  <a:pt x="254" y="0"/>
                 </a:lnTo>
               </a:path>
             </a:pathLst>
@@ -2097,7 +2633,7 @@
           <a:solidFill>
             <a:srgbClr val="729fcf"/>
           </a:solidFill>
-          <a:ln>
+          <a:ln cap="rnd" w="0">
             <a:solidFill>
               <a:srgbClr val="3465a4"/>
             </a:solidFill>
@@ -2127,12 +2663,144 @@
                 <a:latin typeface="Arial"/>
                 <a:ea typeface="DejaVu Sans"/>
               </a:rPr>
-              <a:t>MSC</a:t>
+              <a:t>QtCreator</a:t>
             </a:r>
             <a:endParaRPr b="0" lang="en-US" sz="1800" spc="-1" strike="noStrike">
               <a:latin typeface="Arial"/>
             </a:endParaRPr>
           </a:p>
+        </p:txBody>
+      </p:sp>
+      <p:sp>
+        <p:nvSpPr>
+          <p:cNvPr id="44" name="CustomShape 4_1"/>
+          <p:cNvSpPr/>
+          <p:nvPr/>
+        </p:nvSpPr>
+        <p:spPr>
+          <a:xfrm>
+            <a:off x="6629400" y="914400"/>
+            <a:ext cx="1600200" cy="547920"/>
+          </a:xfrm>
+          <a:custGeom>
+            <a:avLst/>
+            <a:gdLst/>
+            <a:ahLst/>
+            <a:rect l="l" t="t" r="r" b="b"/>
+            <a:pathLst>
+              <a:path w="14733" h="1526">
+                <a:moveTo>
+                  <a:pt x="254" y="0"/>
+                </a:moveTo>
+                <a:lnTo>
+                  <a:pt x="254" y="0"/>
+                </a:lnTo>
+                <a:cubicBezTo>
+                  <a:pt x="210" y="0"/>
+                  <a:pt x="166" y="12"/>
+                  <a:pt x="127" y="34"/>
+                </a:cubicBezTo>
+                <a:cubicBezTo>
+                  <a:pt x="88" y="56"/>
+                  <a:pt x="56" y="88"/>
+                  <a:pt x="34" y="127"/>
+                </a:cubicBezTo>
+                <a:cubicBezTo>
+                  <a:pt x="12" y="166"/>
+                  <a:pt x="0" y="210"/>
+                  <a:pt x="0" y="254"/>
+                </a:cubicBezTo>
+                <a:lnTo>
+                  <a:pt x="0" y="1270"/>
+                </a:lnTo>
+                <a:lnTo>
+                  <a:pt x="0" y="1271"/>
+                </a:lnTo>
+                <a:cubicBezTo>
+                  <a:pt x="0" y="1315"/>
+                  <a:pt x="12" y="1359"/>
+                  <a:pt x="34" y="1398"/>
+                </a:cubicBezTo>
+                <a:cubicBezTo>
+                  <a:pt x="56" y="1437"/>
+                  <a:pt x="88" y="1469"/>
+                  <a:pt x="127" y="1491"/>
+                </a:cubicBezTo>
+                <a:cubicBezTo>
+                  <a:pt x="166" y="1513"/>
+                  <a:pt x="210" y="1525"/>
+                  <a:pt x="254" y="1525"/>
+                </a:cubicBezTo>
+                <a:lnTo>
+                  <a:pt x="14477" y="1524"/>
+                </a:lnTo>
+                <a:lnTo>
+                  <a:pt x="14478" y="1525"/>
+                </a:lnTo>
+                <a:cubicBezTo>
+                  <a:pt x="14522" y="1525"/>
+                  <a:pt x="14566" y="1513"/>
+                  <a:pt x="14605" y="1491"/>
+                </a:cubicBezTo>
+                <a:cubicBezTo>
+                  <a:pt x="14644" y="1469"/>
+                  <a:pt x="14676" y="1437"/>
+                  <a:pt x="14698" y="1398"/>
+                </a:cubicBezTo>
+                <a:cubicBezTo>
+                  <a:pt x="14720" y="1359"/>
+                  <a:pt x="14732" y="1315"/>
+                  <a:pt x="14732" y="1271"/>
+                </a:cubicBezTo>
+                <a:lnTo>
+                  <a:pt x="14731" y="254"/>
+                </a:lnTo>
+                <a:lnTo>
+                  <a:pt x="14732" y="254"/>
+                </a:lnTo>
+                <a:lnTo>
+                  <a:pt x="14732" y="254"/>
+                </a:lnTo>
+                <a:cubicBezTo>
+                  <a:pt x="14732" y="210"/>
+                  <a:pt x="14720" y="166"/>
+                  <a:pt x="14698" y="127"/>
+                </a:cubicBezTo>
+                <a:cubicBezTo>
+                  <a:pt x="14676" y="88"/>
+                  <a:pt x="14644" y="56"/>
+                  <a:pt x="14605" y="34"/>
+                </a:cubicBezTo>
+                <a:cubicBezTo>
+                  <a:pt x="14566" y="12"/>
+                  <a:pt x="14522" y="0"/>
+                  <a:pt x="14478" y="0"/>
+                </a:cubicBezTo>
+                <a:lnTo>
+                  <a:pt x="254" y="0"/>
+                </a:lnTo>
+              </a:path>
+            </a:pathLst>
+          </a:custGeom>
+          <a:solidFill>
+            <a:srgbClr val="729fcf"/>
+          </a:solidFill>
+          <a:ln cap="rnd" w="0">
+            <a:solidFill>
+              <a:srgbClr val="3465a4"/>
+            </a:solidFill>
+          </a:ln>
+        </p:spPr>
+        <p:style>
+          <a:lnRef idx="0"/>
+          <a:fillRef idx="0"/>
+          <a:effectRef idx="0"/>
+          <a:fontRef idx="minor"/>
+        </p:style>
+        <p:txBody>
+          <a:bodyPr wrap="none" lIns="90000" rIns="90000" tIns="45000" bIns="45000" anchor="ctr">
+            <a:noAutofit/>
+          </a:bodyPr>
           <a:p>
             <a:pPr algn="ctr">
               <a:lnSpc>
@@ -2147,159 +2815,7 @@
                 <a:latin typeface="Arial"/>
                 <a:ea typeface="DejaVu Sans"/>
               </a:rPr>
-              <a:t>Editor</a:t>
-            </a:r>
-            <a:endParaRPr b="0" lang="en-US" sz="1800" spc="-1" strike="noStrike">
-              <a:latin typeface="Arial"/>
-            </a:endParaRPr>
-          </a:p>
-        </p:txBody>
-      </p:sp>
-      <p:sp>
-        <p:nvSpPr>
-          <p:cNvPr id="41" name="CustomShape 4"/>
-          <p:cNvSpPr/>
-          <p:nvPr/>
-        </p:nvSpPr>
-        <p:spPr>
-          <a:xfrm>
-            <a:off x="640440" y="182880"/>
-            <a:ext cx="5302800" cy="548280"/>
-          </a:xfrm>
-          <a:custGeom>
-            <a:avLst/>
-            <a:gdLst/>
-            <a:ahLst/>
-            <a:rect l="l" t="t" r="r" b="b"/>
-            <a:pathLst>
-              <a:path w="14733" h="1526">
-                <a:moveTo>
-                  <a:pt x="254" y="0"/>
-                </a:moveTo>
-                <a:lnTo>
-                  <a:pt x="254" y="0"/>
-                </a:lnTo>
-                <a:cubicBezTo>
-                  <a:pt x="210" y="0"/>
-                  <a:pt x="166" y="12"/>
-                  <a:pt x="127" y="34"/>
-                </a:cubicBezTo>
-                <a:cubicBezTo>
-                  <a:pt x="88" y="56"/>
-                  <a:pt x="56" y="88"/>
-                  <a:pt x="34" y="127"/>
-                </a:cubicBezTo>
-                <a:cubicBezTo>
-                  <a:pt x="12" y="166"/>
-                  <a:pt x="0" y="210"/>
-                  <a:pt x="0" y="254"/>
-                </a:cubicBezTo>
-                <a:lnTo>
-                  <a:pt x="0" y="1270"/>
-                </a:lnTo>
-                <a:lnTo>
-                  <a:pt x="0" y="1271"/>
-                </a:lnTo>
-                <a:cubicBezTo>
-                  <a:pt x="0" y="1315"/>
-                  <a:pt x="12" y="1359"/>
-                  <a:pt x="34" y="1398"/>
-                </a:cubicBezTo>
-                <a:cubicBezTo>
-                  <a:pt x="56" y="1437"/>
-                  <a:pt x="88" y="1469"/>
-                  <a:pt x="127" y="1491"/>
-                </a:cubicBezTo>
-                <a:cubicBezTo>
-                  <a:pt x="166" y="1513"/>
-                  <a:pt x="210" y="1525"/>
-                  <a:pt x="254" y="1525"/>
-                </a:cubicBezTo>
-                <a:lnTo>
-                  <a:pt x="14477" y="1524"/>
-                </a:lnTo>
-                <a:lnTo>
-                  <a:pt x="14478" y="1525"/>
-                </a:lnTo>
-                <a:cubicBezTo>
-                  <a:pt x="14522" y="1525"/>
-                  <a:pt x="14566" y="1513"/>
-                  <a:pt x="14605" y="1491"/>
-                </a:cubicBezTo>
-                <a:cubicBezTo>
-                  <a:pt x="14644" y="1469"/>
-                  <a:pt x="14676" y="1437"/>
-                  <a:pt x="14698" y="1398"/>
-                </a:cubicBezTo>
-                <a:cubicBezTo>
-                  <a:pt x="14720" y="1359"/>
-                  <a:pt x="14732" y="1315"/>
-                  <a:pt x="14732" y="1271"/>
-                </a:cubicBezTo>
-                <a:lnTo>
-                  <a:pt x="14731" y="254"/>
-                </a:lnTo>
-                <a:lnTo>
-                  <a:pt x="14732" y="254"/>
-                </a:lnTo>
-                <a:lnTo>
-                  <a:pt x="14732" y="254"/>
-                </a:lnTo>
-                <a:cubicBezTo>
-                  <a:pt x="14732" y="210"/>
-                  <a:pt x="14720" y="166"/>
-                  <a:pt x="14698" y="127"/>
-                </a:cubicBezTo>
-                <a:cubicBezTo>
-                  <a:pt x="14676" y="88"/>
-                  <a:pt x="14644" y="56"/>
-                  <a:pt x="14605" y="34"/>
-                </a:cubicBezTo>
-                <a:cubicBezTo>
-                  <a:pt x="14566" y="12"/>
-                  <a:pt x="14522" y="0"/>
-                  <a:pt x="14478" y="0"/>
-                </a:cubicBezTo>
-                <a:lnTo>
-                  <a:pt x="254" y="0"/>
-                </a:lnTo>
-              </a:path>
-            </a:pathLst>
-          </a:custGeom>
-          <a:solidFill>
-            <a:srgbClr val="729fcf"/>
-          </a:solidFill>
-          <a:ln>
-            <a:solidFill>
-              <a:srgbClr val="3465a4"/>
-            </a:solidFill>
-          </a:ln>
-        </p:spPr>
-        <p:style>
-          <a:lnRef idx="0"/>
-          <a:fillRef idx="0"/>
-          <a:effectRef idx="0"/>
-          <a:fontRef idx="minor"/>
-        </p:style>
-        <p:txBody>
-          <a:bodyPr wrap="none" lIns="90000" rIns="90000" tIns="45000" bIns="45000" anchor="ctr">
-            <a:noAutofit/>
-          </a:bodyPr>
-          <a:p>
-            <a:pPr algn="ctr">
-              <a:lnSpc>
-                <a:spcPct val="100000"/>
-              </a:lnSpc>
-            </a:pPr>
-            <a:r>
-              <a:rPr b="0" lang="en-US" sz="1800" spc="-1" strike="noStrike">
-                <a:solidFill>
-                  <a:srgbClr val="000000"/>
-                </a:solidFill>
-                <a:latin typeface="Arial"/>
-                <a:ea typeface="DejaVu Sans"/>
-              </a:rPr>
-              <a:t>Space Creator</a:t>
+              <a:t>ASN.1 plugin</a:t>
             </a:r>
             <a:endParaRPr b="0" lang="en-US" sz="1800" spc="-1" strike="noStrike">
               <a:latin typeface="Arial"/>
@@ -2339,14 +2855,14 @@
       </p:grpSpPr>
       <p:sp>
         <p:nvSpPr>
-          <p:cNvPr id="42" name="CustomShape 1"/>
+          <p:cNvPr id="45" name="CustomShape 1"/>
           <p:cNvSpPr/>
           <p:nvPr/>
         </p:nvSpPr>
         <p:spPr>
           <a:xfrm>
             <a:off x="1828800" y="182880"/>
-            <a:ext cx="1828800" cy="1737360"/>
+            <a:ext cx="1828440" cy="1737000"/>
           </a:xfrm>
           <a:custGeom>
             <a:avLst/>
@@ -2451,7 +2967,7 @@
           <a:solidFill>
             <a:srgbClr val="729fcf"/>
           </a:solidFill>
-          <a:ln>
+          <a:ln cap="rnd" w="0">
             <a:solidFill>
               <a:srgbClr val="3465a4"/>
             </a:solidFill>
@@ -2511,14 +3027,14 @@
       </p:sp>
       <p:sp>
         <p:nvSpPr>
-          <p:cNvPr id="43" name="CustomShape 2"/>
+          <p:cNvPr id="46" name="CustomShape 2"/>
           <p:cNvSpPr/>
           <p:nvPr/>
         </p:nvSpPr>
         <p:spPr>
           <a:xfrm>
             <a:off x="1920240" y="914400"/>
-            <a:ext cx="1280160" cy="914040"/>
+            <a:ext cx="1279800" cy="913680"/>
           </a:xfrm>
           <a:custGeom>
             <a:avLst/>
@@ -2623,7 +3139,7 @@
           <a:solidFill>
             <a:srgbClr val="729fcf"/>
           </a:solidFill>
-          <a:ln>
+          <a:ln cap="rnd" w="0">
             <a:solidFill>
               <a:srgbClr val="3465a4"/>
             </a:solidFill>
@@ -2663,14 +3179,14 @@
       </p:sp>
       <p:sp>
         <p:nvSpPr>
-          <p:cNvPr id="44" name="CustomShape 3"/>
+          <p:cNvPr id="47" name="CustomShape 3"/>
           <p:cNvSpPr/>
           <p:nvPr/>
         </p:nvSpPr>
         <p:spPr>
           <a:xfrm>
             <a:off x="3931920" y="182880"/>
-            <a:ext cx="1828800" cy="1737360"/>
+            <a:ext cx="1828440" cy="1737000"/>
           </a:xfrm>
           <a:custGeom>
             <a:avLst/>
@@ -2775,7 +3291,7 @@
           <a:solidFill>
             <a:srgbClr val="729fcf"/>
           </a:solidFill>
-          <a:ln>
+          <a:ln cap="rnd" w="0">
             <a:solidFill>
               <a:srgbClr val="3465a4"/>
             </a:solidFill>
@@ -2835,14 +3351,14 @@
       </p:sp>
       <p:sp>
         <p:nvSpPr>
-          <p:cNvPr id="45" name="CustomShape 4"/>
+          <p:cNvPr id="48" name="CustomShape 4"/>
           <p:cNvSpPr/>
           <p:nvPr/>
         </p:nvSpPr>
         <p:spPr>
           <a:xfrm>
             <a:off x="6035040" y="182880"/>
-            <a:ext cx="1828800" cy="1737360"/>
+            <a:ext cx="1828440" cy="1737000"/>
           </a:xfrm>
           <a:custGeom>
             <a:avLst/>
@@ -2947,7 +3463,7 @@
           <a:solidFill>
             <a:srgbClr val="729fcf"/>
           </a:solidFill>
-          <a:ln>
+          <a:ln cap="rnd" w="0">
             <a:solidFill>
               <a:srgbClr val="3465a4"/>
             </a:solidFill>
@@ -2987,14 +3503,14 @@
       </p:sp>
       <p:sp>
         <p:nvSpPr>
-          <p:cNvPr id="46" name="CustomShape 5"/>
+          <p:cNvPr id="49" name="CustomShape 5"/>
           <p:cNvSpPr/>
           <p:nvPr/>
         </p:nvSpPr>
         <p:spPr>
           <a:xfrm>
             <a:off x="8138160" y="182880"/>
-            <a:ext cx="1828800" cy="1737360"/>
+            <a:ext cx="1828440" cy="1737000"/>
           </a:xfrm>
           <a:custGeom>
             <a:avLst/>
@@ -3099,7 +3615,7 @@
           <a:solidFill>
             <a:srgbClr val="729fcf"/>
           </a:solidFill>
-          <a:ln>
+          <a:ln cap="rnd" w="0">
             <a:solidFill>
               <a:srgbClr val="3465a4"/>
             </a:solidFill>
@@ -3139,14 +3655,14 @@
       </p:sp>
       <p:sp>
         <p:nvSpPr>
-          <p:cNvPr id="47" name="CustomShape 6"/>
+          <p:cNvPr id="50" name="CustomShape 6"/>
           <p:cNvSpPr/>
           <p:nvPr/>
         </p:nvSpPr>
         <p:spPr>
           <a:xfrm>
             <a:off x="274320" y="822960"/>
-            <a:ext cx="1188720" cy="1097280"/>
+            <a:ext cx="1188360" cy="1096920"/>
           </a:xfrm>
           <a:custGeom>
             <a:avLst/>
@@ -3251,7 +3767,7 @@
           <a:solidFill>
             <a:srgbClr val="ffffff"/>
           </a:solidFill>
-          <a:ln>
+          <a:ln cap="rnd" w="0">
             <a:solidFill>
               <a:srgbClr val="3465a4"/>
             </a:solidFill>
@@ -3291,20 +3807,20 @@
       </p:sp>
       <p:sp>
         <p:nvSpPr>
-          <p:cNvPr id="48" name="CustomShape 7"/>
+          <p:cNvPr id="51" name="CustomShape 7"/>
           <p:cNvSpPr/>
           <p:nvPr/>
         </p:nvSpPr>
         <p:spPr>
           <a:xfrm>
             <a:off x="1280160" y="1188360"/>
-            <a:ext cx="640080" cy="457200"/>
+            <a:ext cx="639720" cy="456840"/>
           </a:xfrm>
           <a:custGeom>
             <a:avLst/>
             <a:gdLst/>
             <a:ahLst/>
-            <a:rect l="0" t="0" r="r" b="b"/>
+            <a:rect l="l" t="t" r="r" b="b"/>
             <a:pathLst>
               <a:path w="1780" h="1272">
                 <a:moveTo>
@@ -3337,7 +3853,7 @@
           <a:solidFill>
             <a:srgbClr val="000000"/>
           </a:solidFill>
-          <a:ln w="38160">
+          <a:ln cap="rnd" w="38160">
             <a:solidFill>
               <a:srgbClr val="000000"/>
             </a:solidFill>
@@ -3354,20 +3870,20 @@
       </p:sp>
       <p:sp>
         <p:nvSpPr>
-          <p:cNvPr id="49" name="CustomShape 8"/>
+          <p:cNvPr id="52" name="CustomShape 8"/>
           <p:cNvSpPr/>
           <p:nvPr/>
         </p:nvSpPr>
         <p:spPr>
           <a:xfrm>
             <a:off x="3566160" y="1188360"/>
-            <a:ext cx="640080" cy="457200"/>
+            <a:ext cx="639720" cy="456840"/>
           </a:xfrm>
           <a:custGeom>
             <a:avLst/>
             <a:gdLst/>
             <a:ahLst/>
-            <a:rect l="0" t="0" r="r" b="b"/>
+            <a:rect l="l" t="t" r="r" b="b"/>
             <a:pathLst>
               <a:path w="1780" h="1272">
                 <a:moveTo>
@@ -3400,7 +3916,7 @@
           <a:solidFill>
             <a:srgbClr val="000000"/>
           </a:solidFill>
-          <a:ln w="38160">
+          <a:ln cap="rnd" w="38160">
             <a:solidFill>
               <a:srgbClr val="000000"/>
             </a:solidFill>
@@ -3417,20 +3933,20 @@
       </p:sp>
       <p:sp>
         <p:nvSpPr>
-          <p:cNvPr id="50" name="CustomShape 9"/>
+          <p:cNvPr id="53" name="CustomShape 9"/>
           <p:cNvSpPr/>
           <p:nvPr/>
         </p:nvSpPr>
         <p:spPr>
           <a:xfrm>
             <a:off x="5669280" y="1188360"/>
-            <a:ext cx="640080" cy="457200"/>
+            <a:ext cx="639720" cy="456840"/>
           </a:xfrm>
           <a:custGeom>
             <a:avLst/>
             <a:gdLst/>
             <a:ahLst/>
-            <a:rect l="0" t="0" r="r" b="b"/>
+            <a:rect l="l" t="t" r="r" b="b"/>
             <a:pathLst>
               <a:path w="1780" h="1272">
                 <a:moveTo>
@@ -3463,7 +3979,7 @@
           <a:solidFill>
             <a:srgbClr val="000000"/>
           </a:solidFill>
-          <a:ln w="38160">
+          <a:ln cap="rnd" w="38160">
             <a:solidFill>
               <a:srgbClr val="000000"/>
             </a:solidFill>
@@ -3480,20 +3996,20 @@
       </p:sp>
       <p:sp>
         <p:nvSpPr>
-          <p:cNvPr id="51" name="CustomShape 10"/>
+          <p:cNvPr id="54" name="CustomShape 10"/>
           <p:cNvSpPr/>
           <p:nvPr/>
         </p:nvSpPr>
         <p:spPr>
           <a:xfrm>
             <a:off x="7772400" y="1188360"/>
-            <a:ext cx="640080" cy="457200"/>
+            <a:ext cx="639720" cy="456840"/>
           </a:xfrm>
           <a:custGeom>
             <a:avLst/>
             <a:gdLst/>
             <a:ahLst/>
-            <a:rect l="0" t="0" r="r" b="b"/>
+            <a:rect l="l" t="t" r="r" b="b"/>
             <a:pathLst>
               <a:path w="1780" h="1272">
                 <a:moveTo>
@@ -3526,7 +4042,7 @@
           <a:solidFill>
             <a:srgbClr val="000000"/>
           </a:solidFill>
-          <a:ln w="38160">
+          <a:ln cap="rnd" w="38160">
             <a:solidFill>
               <a:srgbClr val="000000"/>
             </a:solidFill>

</xml_diff>